<commit_message>
Diagrams, jenkins pipeline & other Configuration files
</commit_message>
<xml_diff>
--- a/Service Management System - Nayna Bisht.pptx
+++ b/Service Management System - Nayna Bisht.pptx
@@ -10,31 +10,36 @@
     <p:sldId id="258" r:id="rId4"/>
     <p:sldId id="259" r:id="rId5"/>
     <p:sldId id="260" r:id="rId6"/>
-    <p:sldId id="261" r:id="rId7"/>
-    <p:sldId id="262" r:id="rId8"/>
-    <p:sldId id="263" r:id="rId9"/>
-    <p:sldId id="264" r:id="rId10"/>
-    <p:sldId id="265" r:id="rId11"/>
-    <p:sldId id="266" r:id="rId12"/>
+    <p:sldId id="267" r:id="rId7"/>
+    <p:sldId id="269" r:id="rId8"/>
+    <p:sldId id="270" r:id="rId9"/>
+    <p:sldId id="271" r:id="rId10"/>
+    <p:sldId id="268" r:id="rId11"/>
+    <p:sldId id="261" r:id="rId12"/>
+    <p:sldId id="262" r:id="rId13"/>
+    <p:sldId id="263" r:id="rId14"/>
+    <p:sldId id="264" r:id="rId15"/>
+    <p:sldId id="265" r:id="rId16"/>
+    <p:sldId id="266" r:id="rId17"/>
   </p:sldIdLst>
   <p:sldSz cx="18288000" cy="10287000"/>
   <p:notesSz cx="6858000" cy="9144000"/>
   <p:embeddedFontLst>
     <p:embeddedFont>
       <p:font typeface="Muli" panose="020B0604020202020204" charset="0"/>
-      <p:regular r:id="rId13"/>
+      <p:regular r:id="rId18"/>
     </p:embeddedFont>
     <p:embeddedFont>
       <p:font typeface="Muli Bold" panose="020B0604020202020204" charset="0"/>
-      <p:regular r:id="rId14"/>
+      <p:regular r:id="rId19"/>
     </p:embeddedFont>
     <p:embeddedFont>
       <p:font typeface="Muli Heavy" panose="020B0604020202020204" charset="0"/>
-      <p:regular r:id="rId15"/>
+      <p:regular r:id="rId20"/>
     </p:embeddedFont>
     <p:embeddedFont>
       <p:font typeface="Muli Semi-Bold" panose="020B0604020202020204" charset="0"/>
-      <p:regular r:id="rId16"/>
+      <p:regular r:id="rId21"/>
     </p:embeddedFont>
   </p:embeddedFontLst>
   <p:defaultTextStyle>
@@ -331,7 +336,7 @@
             <a:fld id="{1D8BD707-D9CF-40AE-B4C6-C98DA3205C09}" type="datetimeFigureOut">
               <a:rPr lang="en-US" smtClean="0"/>
               <a:pPr/>
-              <a:t>1/7/2026</a:t>
+              <a:t>1/9/2026</a:t>
             </a:fld>
             <a:endParaRPr lang="en-US"/>
           </a:p>
@@ -496,7 +501,7 @@
             <a:fld id="{1D8BD707-D9CF-40AE-B4C6-C98DA3205C09}" type="datetimeFigureOut">
               <a:rPr lang="en-US" smtClean="0"/>
               <a:pPr/>
-              <a:t>1/7/2026</a:t>
+              <a:t>1/9/2026</a:t>
             </a:fld>
             <a:endParaRPr lang="en-US"/>
           </a:p>
@@ -671,7 +676,7 @@
             <a:fld id="{1D8BD707-D9CF-40AE-B4C6-C98DA3205C09}" type="datetimeFigureOut">
               <a:rPr lang="en-US" smtClean="0"/>
               <a:pPr/>
-              <a:t>1/7/2026</a:t>
+              <a:t>1/9/2026</a:t>
             </a:fld>
             <a:endParaRPr lang="en-US"/>
           </a:p>
@@ -836,7 +841,7 @@
             <a:fld id="{1D8BD707-D9CF-40AE-B4C6-C98DA3205C09}" type="datetimeFigureOut">
               <a:rPr lang="en-US" smtClean="0"/>
               <a:pPr/>
-              <a:t>1/7/2026</a:t>
+              <a:t>1/9/2026</a:t>
             </a:fld>
             <a:endParaRPr lang="en-US"/>
           </a:p>
@@ -1078,7 +1083,7 @@
             <a:fld id="{1D8BD707-D9CF-40AE-B4C6-C98DA3205C09}" type="datetimeFigureOut">
               <a:rPr lang="en-US" smtClean="0"/>
               <a:pPr/>
-              <a:t>1/7/2026</a:t>
+              <a:t>1/9/2026</a:t>
             </a:fld>
             <a:endParaRPr lang="en-US"/>
           </a:p>
@@ -1360,7 +1365,7 @@
             <a:fld id="{1D8BD707-D9CF-40AE-B4C6-C98DA3205C09}" type="datetimeFigureOut">
               <a:rPr lang="en-US" smtClean="0"/>
               <a:pPr/>
-              <a:t>1/7/2026</a:t>
+              <a:t>1/9/2026</a:t>
             </a:fld>
             <a:endParaRPr lang="en-US"/>
           </a:p>
@@ -1776,7 +1781,7 @@
             <a:fld id="{1D8BD707-D9CF-40AE-B4C6-C98DA3205C09}" type="datetimeFigureOut">
               <a:rPr lang="en-US" smtClean="0"/>
               <a:pPr/>
-              <a:t>1/7/2026</a:t>
+              <a:t>1/9/2026</a:t>
             </a:fld>
             <a:endParaRPr lang="en-US"/>
           </a:p>
@@ -1890,7 +1895,7 @@
             <a:fld id="{1D8BD707-D9CF-40AE-B4C6-C98DA3205C09}" type="datetimeFigureOut">
               <a:rPr lang="en-US" smtClean="0"/>
               <a:pPr/>
-              <a:t>1/7/2026</a:t>
+              <a:t>1/9/2026</a:t>
             </a:fld>
             <a:endParaRPr lang="en-US"/>
           </a:p>
@@ -1982,7 +1987,7 @@
             <a:fld id="{1D8BD707-D9CF-40AE-B4C6-C98DA3205C09}" type="datetimeFigureOut">
               <a:rPr lang="en-US" smtClean="0"/>
               <a:pPr/>
-              <a:t>1/7/2026</a:t>
+              <a:t>1/9/2026</a:t>
             </a:fld>
             <a:endParaRPr lang="en-US"/>
           </a:p>
@@ -2254,7 +2259,7 @@
             <a:fld id="{1D8BD707-D9CF-40AE-B4C6-C98DA3205C09}" type="datetimeFigureOut">
               <a:rPr lang="en-US" smtClean="0"/>
               <a:pPr/>
-              <a:t>1/7/2026</a:t>
+              <a:t>1/9/2026</a:t>
             </a:fld>
             <a:endParaRPr lang="en-US"/>
           </a:p>
@@ -2503,7 +2508,7 @@
             <a:fld id="{1D8BD707-D9CF-40AE-B4C6-C98DA3205C09}" type="datetimeFigureOut">
               <a:rPr lang="en-US" smtClean="0"/>
               <a:pPr/>
-              <a:t>1/7/2026</a:t>
+              <a:t>1/9/2026</a:t>
             </a:fld>
             <a:endParaRPr lang="en-US"/>
           </a:p>
@@ -2711,7 +2716,7 @@
             <a:fld id="{1D8BD707-D9CF-40AE-B4C6-C98DA3205C09}" type="datetimeFigureOut">
               <a:rPr lang="en-US" smtClean="0"/>
               <a:pPr/>
-              <a:t>1/7/2026</a:t>
+              <a:t>1/9/2026</a:t>
             </a:fld>
             <a:endParaRPr lang="en-US"/>
           </a:p>
@@ -3447,6 +3452,1775 @@
 <file path=ppt/slides/slide10.xml><?xml version="1.0" encoding="utf-8"?>
 <p:sld xmlns:a="http://schemas.openxmlformats.org/drawingml/2006/main" xmlns:r="http://schemas.openxmlformats.org/officeDocument/2006/relationships" xmlns:p="http://schemas.openxmlformats.org/presentationml/2006/main">
   <p:cSld>
+    <p:spTree>
+      <p:nvGrpSpPr>
+        <p:cNvPr id="1" name=""/>
+        <p:cNvGrpSpPr/>
+        <p:nvPr/>
+      </p:nvGrpSpPr>
+      <p:grpSpPr>
+        <a:xfrm>
+          <a:off x="0" y="0"/>
+          <a:ext cx="0" cy="0"/>
+          <a:chOff x="0" y="0"/>
+          <a:chExt cx="0" cy="0"/>
+        </a:xfrm>
+      </p:grpSpPr>
+      <p:pic>
+        <p:nvPicPr>
+          <p:cNvPr id="3" name="Picture 2">
+            <a:extLst>
+              <a:ext uri="{FF2B5EF4-FFF2-40B4-BE49-F238E27FC236}">
+                <a16:creationId xmlns:a16="http://schemas.microsoft.com/office/drawing/2014/main" id="{A9125623-76F2-A90D-FB2B-D9E0BDF91545}"/>
+              </a:ext>
+            </a:extLst>
+          </p:cNvPr>
+          <p:cNvPicPr>
+            <a:picLocks noChangeAspect="1"/>
+          </p:cNvPicPr>
+          <p:nvPr/>
+        </p:nvPicPr>
+        <p:blipFill>
+          <a:blip r:embed="rId2">
+            <a:extLst>
+              <a:ext uri="{28A0092B-C50C-407E-A947-70E740481C1C}">
+                <a14:useLocalDpi xmlns:a14="http://schemas.microsoft.com/office/drawing/2010/main" val="0"/>
+              </a:ext>
+            </a:extLst>
+          </a:blip>
+          <a:stretch>
+            <a:fillRect/>
+          </a:stretch>
+        </p:blipFill>
+        <p:spPr>
+          <a:xfrm>
+            <a:off x="4331318" y="0"/>
+            <a:ext cx="9625364" cy="10287000"/>
+          </a:xfrm>
+          <a:prstGeom prst="rect">
+            <a:avLst/>
+          </a:prstGeom>
+        </p:spPr>
+      </p:pic>
+    </p:spTree>
+    <p:extLst>
+      <p:ext uri="{BB962C8B-B14F-4D97-AF65-F5344CB8AC3E}">
+        <p14:creationId xmlns:p14="http://schemas.microsoft.com/office/powerpoint/2010/main" val="1517397266"/>
+      </p:ext>
+    </p:extLst>
+  </p:cSld>
+  <p:clrMapOvr>
+    <a:masterClrMapping/>
+  </p:clrMapOvr>
+</p:sld>
+</file>
+
+<file path=ppt/slides/slide11.xml><?xml version="1.0" encoding="utf-8"?>
+<p:sld xmlns:a="http://schemas.openxmlformats.org/drawingml/2006/main" xmlns:r="http://schemas.openxmlformats.org/officeDocument/2006/relationships" xmlns:p="http://schemas.openxmlformats.org/presentationml/2006/main">
+  <p:cSld>
+    <p:bg>
+      <p:bgPr>
+        <a:solidFill>
+          <a:srgbClr val="F1EEEE"/>
+        </a:solidFill>
+        <a:effectLst/>
+      </p:bgPr>
+    </p:bg>
+    <p:spTree>
+      <p:nvGrpSpPr>
+        <p:cNvPr id="1" name=""/>
+        <p:cNvGrpSpPr/>
+        <p:nvPr/>
+      </p:nvGrpSpPr>
+      <p:grpSpPr>
+        <a:xfrm>
+          <a:off x="0" y="0"/>
+          <a:ext cx="0" cy="0"/>
+          <a:chOff x="0" y="0"/>
+          <a:chExt cx="0" cy="0"/>
+        </a:xfrm>
+      </p:grpSpPr>
+      <p:sp>
+        <p:nvSpPr>
+          <p:cNvPr id="2" name="Freeform 2"/>
+          <p:cNvSpPr/>
+          <p:nvPr/>
+        </p:nvSpPr>
+        <p:spPr>
+          <a:xfrm>
+            <a:off x="0" y="91440"/>
+            <a:ext cx="18288000" cy="9166860"/>
+          </a:xfrm>
+          <a:custGeom>
+            <a:avLst/>
+            <a:gdLst/>
+            <a:ahLst/>
+            <a:cxnLst/>
+            <a:rect l="l" t="t" r="r" b="b"/>
+            <a:pathLst>
+              <a:path w="18288000" h="9166860">
+                <a:moveTo>
+                  <a:pt x="0" y="0"/>
+                </a:moveTo>
+                <a:lnTo>
+                  <a:pt x="18288000" y="0"/>
+                </a:lnTo>
+                <a:lnTo>
+                  <a:pt x="18288000" y="9166860"/>
+                </a:lnTo>
+                <a:lnTo>
+                  <a:pt x="0" y="9166860"/>
+                </a:lnTo>
+                <a:lnTo>
+                  <a:pt x="0" y="0"/>
+                </a:lnTo>
+                <a:close/>
+              </a:path>
+            </a:pathLst>
+          </a:custGeom>
+          <a:blipFill>
+            <a:blip r:embed="rId2"/>
+            <a:stretch>
+              <a:fillRect/>
+            </a:stretch>
+          </a:blipFill>
+        </p:spPr>
+      </p:sp>
+      <p:sp>
+        <p:nvSpPr>
+          <p:cNvPr id="3" name="TextBox 3"/>
+          <p:cNvSpPr txBox="1"/>
+          <p:nvPr/>
+        </p:nvSpPr>
+        <p:spPr>
+          <a:xfrm>
+            <a:off x="4815564" y="9458654"/>
+            <a:ext cx="7544007" cy="828346"/>
+          </a:xfrm>
+          <a:prstGeom prst="rect">
+            <a:avLst/>
+          </a:prstGeom>
+        </p:spPr>
+        <p:txBody>
+          <a:bodyPr lIns="0" tIns="0" rIns="0" bIns="0" rtlCol="0" anchor="t">
+            <a:spAutoFit/>
+          </a:bodyPr>
+          <a:lstStyle/>
+          <a:p>
+            <a:pPr algn="ctr">
+              <a:lnSpc>
+                <a:spcPts val="6881"/>
+              </a:lnSpc>
+              <a:spcBef>
+                <a:spcPct val="0"/>
+              </a:spcBef>
+            </a:pPr>
+            <a:r>
+              <a:rPr lang="en-US" sz="4915" b="1">
+                <a:solidFill>
+                  <a:srgbClr val="000000"/>
+                </a:solidFill>
+                <a:latin typeface="Muli Bold"/>
+                <a:ea typeface="Muli Bold"/>
+                <a:cs typeface="Muli Bold"/>
+                <a:sym typeface="Muli Bold"/>
+              </a:rPr>
+              <a:t>Website Landing Page UI</a:t>
+            </a:r>
+          </a:p>
+        </p:txBody>
+      </p:sp>
+    </p:spTree>
+  </p:cSld>
+  <p:clrMapOvr>
+    <a:masterClrMapping/>
+  </p:clrMapOvr>
+</p:sld>
+</file>
+
+<file path=ppt/slides/slide12.xml><?xml version="1.0" encoding="utf-8"?>
+<p:sld xmlns:a="http://schemas.openxmlformats.org/drawingml/2006/main" xmlns:r="http://schemas.openxmlformats.org/officeDocument/2006/relationships" xmlns:p="http://schemas.openxmlformats.org/presentationml/2006/main">
+  <p:cSld>
+    <p:bg>
+      <p:bgPr>
+        <a:solidFill>
+          <a:srgbClr val="F1EEEE"/>
+        </a:solidFill>
+        <a:effectLst/>
+      </p:bgPr>
+    </p:bg>
+    <p:spTree>
+      <p:nvGrpSpPr>
+        <p:cNvPr id="1" name=""/>
+        <p:cNvGrpSpPr/>
+        <p:nvPr/>
+      </p:nvGrpSpPr>
+      <p:grpSpPr>
+        <a:xfrm>
+          <a:off x="0" y="0"/>
+          <a:ext cx="0" cy="0"/>
+          <a:chOff x="0" y="0"/>
+          <a:chExt cx="0" cy="0"/>
+        </a:xfrm>
+      </p:grpSpPr>
+      <p:sp>
+        <p:nvSpPr>
+          <p:cNvPr id="2" name="Freeform 2"/>
+          <p:cNvSpPr/>
+          <p:nvPr/>
+        </p:nvSpPr>
+        <p:spPr>
+          <a:xfrm>
+            <a:off x="0" y="0"/>
+            <a:ext cx="16863934" cy="10287000"/>
+          </a:xfrm>
+          <a:custGeom>
+            <a:avLst/>
+            <a:gdLst/>
+            <a:ahLst/>
+            <a:cxnLst/>
+            <a:rect l="l" t="t" r="r" b="b"/>
+            <a:pathLst>
+              <a:path w="16863934" h="10287000">
+                <a:moveTo>
+                  <a:pt x="0" y="0"/>
+                </a:moveTo>
+                <a:lnTo>
+                  <a:pt x="16863934" y="0"/>
+                </a:lnTo>
+                <a:lnTo>
+                  <a:pt x="16863934" y="10287000"/>
+                </a:lnTo>
+                <a:lnTo>
+                  <a:pt x="0" y="10287000"/>
+                </a:lnTo>
+                <a:lnTo>
+                  <a:pt x="0" y="0"/>
+                </a:lnTo>
+                <a:close/>
+              </a:path>
+            </a:pathLst>
+          </a:custGeom>
+          <a:blipFill>
+            <a:blip r:embed="rId2"/>
+            <a:stretch>
+              <a:fillRect/>
+            </a:stretch>
+          </a:blipFill>
+        </p:spPr>
+      </p:sp>
+      <p:sp>
+        <p:nvSpPr>
+          <p:cNvPr id="3" name="TextBox 3"/>
+          <p:cNvSpPr txBox="1"/>
+          <p:nvPr/>
+        </p:nvSpPr>
+        <p:spPr>
+          <a:xfrm>
+            <a:off x="16863934" y="9525"/>
+            <a:ext cx="1045672" cy="10277475"/>
+          </a:xfrm>
+          <a:prstGeom prst="rect">
+            <a:avLst/>
+          </a:prstGeom>
+        </p:spPr>
+        <p:txBody>
+          <a:bodyPr lIns="0" tIns="0" rIns="0" bIns="0" rtlCol="0" anchor="t">
+            <a:spAutoFit/>
+          </a:bodyPr>
+          <a:lstStyle/>
+          <a:p>
+            <a:pPr algn="ctr">
+              <a:lnSpc>
+                <a:spcPts val="10158"/>
+              </a:lnSpc>
+            </a:pPr>
+            <a:r>
+              <a:rPr lang="en-US" sz="8465" b="1">
+                <a:solidFill>
+                  <a:srgbClr val="305049"/>
+                </a:solidFill>
+                <a:latin typeface="Muli Heavy"/>
+                <a:ea typeface="Muli Heavy"/>
+                <a:cs typeface="Muli Heavy"/>
+                <a:sym typeface="Muli Heavy"/>
+              </a:rPr>
+              <a:t>S</a:t>
+            </a:r>
+          </a:p>
+          <a:p>
+            <a:pPr algn="ctr">
+              <a:lnSpc>
+                <a:spcPts val="10158"/>
+              </a:lnSpc>
+            </a:pPr>
+            <a:r>
+              <a:rPr lang="en-US" sz="8465" b="1">
+                <a:solidFill>
+                  <a:srgbClr val="305049"/>
+                </a:solidFill>
+                <a:latin typeface="Muli Heavy"/>
+                <a:ea typeface="Muli Heavy"/>
+                <a:cs typeface="Muli Heavy"/>
+                <a:sym typeface="Muli Heavy"/>
+              </a:rPr>
+              <a:t>E</a:t>
+            </a:r>
+          </a:p>
+          <a:p>
+            <a:pPr algn="ctr">
+              <a:lnSpc>
+                <a:spcPts val="10158"/>
+              </a:lnSpc>
+            </a:pPr>
+            <a:r>
+              <a:rPr lang="en-US" sz="8465" b="1">
+                <a:solidFill>
+                  <a:srgbClr val="305049"/>
+                </a:solidFill>
+                <a:latin typeface="Muli Heavy"/>
+                <a:ea typeface="Muli Heavy"/>
+                <a:cs typeface="Muli Heavy"/>
+                <a:sym typeface="Muli Heavy"/>
+              </a:rPr>
+              <a:t>R</a:t>
+            </a:r>
+          </a:p>
+          <a:p>
+            <a:pPr algn="ctr">
+              <a:lnSpc>
+                <a:spcPts val="10158"/>
+              </a:lnSpc>
+            </a:pPr>
+            <a:r>
+              <a:rPr lang="en-US" sz="8465" b="1">
+                <a:solidFill>
+                  <a:srgbClr val="305049"/>
+                </a:solidFill>
+                <a:latin typeface="Muli Heavy"/>
+                <a:ea typeface="Muli Heavy"/>
+                <a:cs typeface="Muli Heavy"/>
+                <a:sym typeface="Muli Heavy"/>
+              </a:rPr>
+              <a:t>V</a:t>
+            </a:r>
+          </a:p>
+          <a:p>
+            <a:pPr algn="ctr">
+              <a:lnSpc>
+                <a:spcPts val="10158"/>
+              </a:lnSpc>
+            </a:pPr>
+            <a:r>
+              <a:rPr lang="en-US" sz="8465" b="1">
+                <a:solidFill>
+                  <a:srgbClr val="305049"/>
+                </a:solidFill>
+                <a:latin typeface="Muli Heavy"/>
+                <a:ea typeface="Muli Heavy"/>
+                <a:cs typeface="Muli Heavy"/>
+                <a:sym typeface="Muli Heavy"/>
+              </a:rPr>
+              <a:t>I</a:t>
+            </a:r>
+          </a:p>
+          <a:p>
+            <a:pPr algn="ctr">
+              <a:lnSpc>
+                <a:spcPts val="10158"/>
+              </a:lnSpc>
+            </a:pPr>
+            <a:r>
+              <a:rPr lang="en-US" sz="8465" b="1">
+                <a:solidFill>
+                  <a:srgbClr val="305049"/>
+                </a:solidFill>
+                <a:latin typeface="Muli Heavy"/>
+                <a:ea typeface="Muli Heavy"/>
+                <a:cs typeface="Muli Heavy"/>
+                <a:sym typeface="Muli Heavy"/>
+              </a:rPr>
+              <a:t>C</a:t>
+            </a:r>
+          </a:p>
+          <a:p>
+            <a:pPr algn="ctr">
+              <a:lnSpc>
+                <a:spcPts val="10158"/>
+              </a:lnSpc>
+            </a:pPr>
+            <a:r>
+              <a:rPr lang="en-US" sz="8465" b="1">
+                <a:solidFill>
+                  <a:srgbClr val="305049"/>
+                </a:solidFill>
+                <a:latin typeface="Muli Heavy"/>
+                <a:ea typeface="Muli Heavy"/>
+                <a:cs typeface="Muli Heavy"/>
+                <a:sym typeface="Muli Heavy"/>
+              </a:rPr>
+              <a:t>E</a:t>
+            </a:r>
+          </a:p>
+          <a:p>
+            <a:pPr algn="ctr">
+              <a:lnSpc>
+                <a:spcPts val="10158"/>
+              </a:lnSpc>
+            </a:pPr>
+            <a:r>
+              <a:rPr lang="en-US" sz="8465" b="1">
+                <a:solidFill>
+                  <a:srgbClr val="305049"/>
+                </a:solidFill>
+                <a:latin typeface="Muli Heavy"/>
+                <a:ea typeface="Muli Heavy"/>
+                <a:cs typeface="Muli Heavy"/>
+                <a:sym typeface="Muli Heavy"/>
+              </a:rPr>
+              <a:t>S</a:t>
+            </a:r>
+          </a:p>
+        </p:txBody>
+      </p:sp>
+    </p:spTree>
+  </p:cSld>
+  <p:clrMapOvr>
+    <a:masterClrMapping/>
+  </p:clrMapOvr>
+</p:sld>
+</file>
+
+<file path=ppt/slides/slide13.xml><?xml version="1.0" encoding="utf-8"?>
+<p:sld xmlns:a="http://schemas.openxmlformats.org/drawingml/2006/main" xmlns:r="http://schemas.openxmlformats.org/officeDocument/2006/relationships" xmlns:p="http://schemas.openxmlformats.org/presentationml/2006/main">
+  <p:cSld>
+    <p:bg>
+      <p:bgPr>
+        <a:solidFill>
+          <a:srgbClr val="EFD1A9"/>
+        </a:solidFill>
+        <a:effectLst/>
+      </p:bgPr>
+    </p:bg>
+    <p:spTree>
+      <p:nvGrpSpPr>
+        <p:cNvPr id="1" name=""/>
+        <p:cNvGrpSpPr/>
+        <p:nvPr/>
+      </p:nvGrpSpPr>
+      <p:grpSpPr>
+        <a:xfrm>
+          <a:off x="0" y="0"/>
+          <a:ext cx="0" cy="0"/>
+          <a:chOff x="0" y="0"/>
+          <a:chExt cx="0" cy="0"/>
+        </a:xfrm>
+      </p:grpSpPr>
+      <p:sp>
+        <p:nvSpPr>
+          <p:cNvPr id="2" name="TextBox 2"/>
+          <p:cNvSpPr txBox="1"/>
+          <p:nvPr/>
+        </p:nvSpPr>
+        <p:spPr>
+          <a:xfrm>
+            <a:off x="6750467" y="885825"/>
+            <a:ext cx="10508833" cy="1088863"/>
+          </a:xfrm>
+          <a:prstGeom prst="rect">
+            <a:avLst/>
+          </a:prstGeom>
+        </p:spPr>
+        <p:txBody>
+          <a:bodyPr lIns="0" tIns="0" rIns="0" bIns="0" rtlCol="0" anchor="t">
+            <a:spAutoFit/>
+          </a:bodyPr>
+          <a:lstStyle/>
+          <a:p>
+            <a:pPr algn="l">
+              <a:lnSpc>
+                <a:spcPts val="8991"/>
+              </a:lnSpc>
+              <a:spcBef>
+                <a:spcPct val="0"/>
+              </a:spcBef>
+            </a:pPr>
+            <a:r>
+              <a:rPr lang="en-US" sz="6422" b="1" u="sng">
+                <a:solidFill>
+                  <a:srgbClr val="305049"/>
+                </a:solidFill>
+                <a:latin typeface="Muli Bold"/>
+                <a:ea typeface="Muli Bold"/>
+                <a:cs typeface="Muli Bold"/>
+                <a:sym typeface="Muli Bold"/>
+              </a:rPr>
+              <a:t>Technology Stack</a:t>
+            </a:r>
+          </a:p>
+        </p:txBody>
+      </p:sp>
+      <p:sp>
+        <p:nvSpPr>
+          <p:cNvPr id="3" name="TextBox 3"/>
+          <p:cNvSpPr txBox="1"/>
+          <p:nvPr/>
+        </p:nvSpPr>
+        <p:spPr>
+          <a:xfrm>
+            <a:off x="5705439" y="2218347"/>
+            <a:ext cx="5637525" cy="4324774"/>
+          </a:xfrm>
+          <a:prstGeom prst="rect">
+            <a:avLst/>
+          </a:prstGeom>
+        </p:spPr>
+        <p:txBody>
+          <a:bodyPr lIns="0" tIns="0" rIns="0" bIns="0" rtlCol="0" anchor="t">
+            <a:spAutoFit/>
+          </a:bodyPr>
+          <a:lstStyle/>
+          <a:p>
+            <a:pPr algn="l">
+              <a:lnSpc>
+                <a:spcPts val="3362"/>
+              </a:lnSpc>
+            </a:pPr>
+            <a:r>
+              <a:rPr lang="en-US" sz="2402" b="1" dirty="0">
+                <a:solidFill>
+                  <a:srgbClr val="305049"/>
+                </a:solidFill>
+                <a:latin typeface="Muli"/>
+                <a:ea typeface="Muli"/>
+                <a:cs typeface="Muli"/>
+                <a:sym typeface="Muli"/>
+              </a:rPr>
+              <a:t>Backend</a:t>
+            </a:r>
+          </a:p>
+          <a:p>
+            <a:pPr marL="518610" lvl="1" indent="-259305" algn="l">
+              <a:lnSpc>
+                <a:spcPts val="3362"/>
+              </a:lnSpc>
+              <a:buFont typeface="Arial"/>
+              <a:buChar char="•"/>
+            </a:pPr>
+            <a:r>
+              <a:rPr lang="en-US" sz="2402" dirty="0">
+                <a:solidFill>
+                  <a:srgbClr val="305049"/>
+                </a:solidFill>
+                <a:latin typeface="Muli"/>
+                <a:ea typeface="Muli"/>
+                <a:cs typeface="Muli"/>
+                <a:sym typeface="Muli"/>
+              </a:rPr>
+              <a:t>Java, Spring Boot</a:t>
+            </a:r>
+          </a:p>
+          <a:p>
+            <a:pPr marL="518610" lvl="1" indent="-259305" algn="l">
+              <a:lnSpc>
+                <a:spcPts val="3362"/>
+              </a:lnSpc>
+              <a:spcBef>
+                <a:spcPct val="0"/>
+              </a:spcBef>
+              <a:buFont typeface="Arial"/>
+              <a:buChar char="•"/>
+            </a:pPr>
+            <a:r>
+              <a:rPr lang="en-US" sz="2402" dirty="0">
+                <a:solidFill>
+                  <a:srgbClr val="305049"/>
+                </a:solidFill>
+                <a:latin typeface="Muli"/>
+                <a:ea typeface="Muli"/>
+                <a:cs typeface="Muli"/>
+                <a:sym typeface="Muli"/>
+              </a:rPr>
+              <a:t>Spring Security (JWT Authentication)</a:t>
+            </a:r>
+          </a:p>
+          <a:p>
+            <a:pPr marL="518610" lvl="1" indent="-259305" algn="l">
+              <a:lnSpc>
+                <a:spcPts val="3362"/>
+              </a:lnSpc>
+              <a:spcBef>
+                <a:spcPct val="0"/>
+              </a:spcBef>
+              <a:buFont typeface="Arial"/>
+              <a:buChar char="•"/>
+            </a:pPr>
+            <a:r>
+              <a:rPr lang="en-US" sz="2402" dirty="0">
+                <a:solidFill>
+                  <a:srgbClr val="305049"/>
+                </a:solidFill>
+                <a:latin typeface="Muli"/>
+                <a:ea typeface="Muli"/>
+                <a:cs typeface="Muli"/>
+                <a:sym typeface="Muli"/>
+              </a:rPr>
+              <a:t>REST APIs</a:t>
+            </a:r>
+          </a:p>
+          <a:p>
+            <a:pPr algn="l">
+              <a:lnSpc>
+                <a:spcPts val="3362"/>
+              </a:lnSpc>
+              <a:spcBef>
+                <a:spcPct val="0"/>
+              </a:spcBef>
+            </a:pPr>
+            <a:endParaRPr lang="en-US" sz="2402" dirty="0">
+              <a:solidFill>
+                <a:srgbClr val="305049"/>
+              </a:solidFill>
+              <a:latin typeface="Muli"/>
+              <a:ea typeface="Muli"/>
+              <a:cs typeface="Muli"/>
+              <a:sym typeface="Muli"/>
+            </a:endParaRPr>
+          </a:p>
+          <a:p>
+            <a:pPr algn="l">
+              <a:lnSpc>
+                <a:spcPts val="3362"/>
+              </a:lnSpc>
+              <a:spcBef>
+                <a:spcPct val="0"/>
+              </a:spcBef>
+            </a:pPr>
+            <a:r>
+              <a:rPr lang="en-US" sz="2402" b="1" dirty="0">
+                <a:solidFill>
+                  <a:srgbClr val="305049"/>
+                </a:solidFill>
+                <a:latin typeface="Muli"/>
+                <a:ea typeface="Muli"/>
+                <a:cs typeface="Muli"/>
+                <a:sym typeface="Muli"/>
+              </a:rPr>
+              <a:t>Frontend</a:t>
+            </a:r>
+          </a:p>
+          <a:p>
+            <a:pPr marL="518610" lvl="1" indent="-259305" algn="l">
+              <a:lnSpc>
+                <a:spcPts val="3362"/>
+              </a:lnSpc>
+              <a:spcBef>
+                <a:spcPct val="0"/>
+              </a:spcBef>
+              <a:buFont typeface="Arial"/>
+              <a:buChar char="•"/>
+            </a:pPr>
+            <a:r>
+              <a:rPr lang="en-US" sz="2402" dirty="0">
+                <a:solidFill>
+                  <a:srgbClr val="305049"/>
+                </a:solidFill>
+                <a:latin typeface="Muli"/>
+                <a:ea typeface="Muli"/>
+                <a:cs typeface="Muli"/>
+                <a:sym typeface="Muli"/>
+              </a:rPr>
+              <a:t>Angular</a:t>
+            </a:r>
+          </a:p>
+          <a:p>
+            <a:pPr marL="518610" lvl="1" indent="-259305" algn="l">
+              <a:lnSpc>
+                <a:spcPts val="3362"/>
+              </a:lnSpc>
+              <a:spcBef>
+                <a:spcPct val="0"/>
+              </a:spcBef>
+              <a:buFont typeface="Arial"/>
+              <a:buChar char="•"/>
+            </a:pPr>
+            <a:r>
+              <a:rPr lang="en-US" sz="2402" dirty="0">
+                <a:solidFill>
+                  <a:srgbClr val="305049"/>
+                </a:solidFill>
+                <a:latin typeface="Muli"/>
+                <a:ea typeface="Muli"/>
+                <a:cs typeface="Muli"/>
+                <a:sym typeface="Muli"/>
+              </a:rPr>
+              <a:t>Tailwind / CSS for UI design</a:t>
+            </a:r>
+          </a:p>
+          <a:p>
+            <a:pPr algn="l">
+              <a:lnSpc>
+                <a:spcPts val="3362"/>
+              </a:lnSpc>
+              <a:spcBef>
+                <a:spcPct val="0"/>
+              </a:spcBef>
+            </a:pPr>
+            <a:endParaRPr lang="en-US" sz="2402" dirty="0">
+              <a:solidFill>
+                <a:srgbClr val="305049"/>
+              </a:solidFill>
+              <a:latin typeface="Muli"/>
+              <a:ea typeface="Muli"/>
+              <a:cs typeface="Muli"/>
+              <a:sym typeface="Muli"/>
+            </a:endParaRPr>
+          </a:p>
+        </p:txBody>
+      </p:sp>
+      <p:sp>
+        <p:nvSpPr>
+          <p:cNvPr id="4" name="Freeform 4"/>
+          <p:cNvSpPr/>
+          <p:nvPr/>
+        </p:nvSpPr>
+        <p:spPr>
+          <a:xfrm rot="-5400000">
+            <a:off x="-3066153" y="2436744"/>
+            <a:ext cx="10827025" cy="5413512"/>
+          </a:xfrm>
+          <a:custGeom>
+            <a:avLst/>
+            <a:gdLst/>
+            <a:ahLst/>
+            <a:cxnLst/>
+            <a:rect l="l" t="t" r="r" b="b"/>
+            <a:pathLst>
+              <a:path w="10827025" h="5413512">
+                <a:moveTo>
+                  <a:pt x="0" y="0"/>
+                </a:moveTo>
+                <a:lnTo>
+                  <a:pt x="10827024" y="0"/>
+                </a:lnTo>
+                <a:lnTo>
+                  <a:pt x="10827024" y="5413512"/>
+                </a:lnTo>
+                <a:lnTo>
+                  <a:pt x="0" y="5413512"/>
+                </a:lnTo>
+                <a:lnTo>
+                  <a:pt x="0" y="0"/>
+                </a:lnTo>
+                <a:close/>
+              </a:path>
+            </a:pathLst>
+          </a:custGeom>
+          <a:blipFill>
+            <a:blip r:embed="rId2">
+              <a:extLst>
+                <a:ext uri="{96DAC541-7B7A-43D3-8B79-37D633B846F1}">
+                  <asvg:svgBlip xmlns:asvg="http://schemas.microsoft.com/office/drawing/2016/SVG/main" r:embed="rId3"/>
+                </a:ext>
+              </a:extLst>
+            </a:blip>
+            <a:stretch>
+              <a:fillRect/>
+            </a:stretch>
+          </a:blipFill>
+        </p:spPr>
+      </p:sp>
+      <p:sp>
+        <p:nvSpPr>
+          <p:cNvPr id="5" name="TextBox 5"/>
+          <p:cNvSpPr txBox="1"/>
+          <p:nvPr/>
+        </p:nvSpPr>
+        <p:spPr>
+          <a:xfrm>
+            <a:off x="11621775" y="2218347"/>
+            <a:ext cx="5637525" cy="4760790"/>
+          </a:xfrm>
+          <a:prstGeom prst="rect">
+            <a:avLst/>
+          </a:prstGeom>
+        </p:spPr>
+        <p:txBody>
+          <a:bodyPr lIns="0" tIns="0" rIns="0" bIns="0" rtlCol="0" anchor="t">
+            <a:spAutoFit/>
+          </a:bodyPr>
+          <a:lstStyle/>
+          <a:p>
+            <a:pPr algn="l">
+              <a:lnSpc>
+                <a:spcPts val="3362"/>
+              </a:lnSpc>
+              <a:spcBef>
+                <a:spcPct val="0"/>
+              </a:spcBef>
+            </a:pPr>
+            <a:r>
+              <a:rPr lang="en-US" sz="2402" b="1" dirty="0">
+                <a:solidFill>
+                  <a:srgbClr val="305049"/>
+                </a:solidFill>
+                <a:latin typeface="Muli"/>
+                <a:ea typeface="Muli"/>
+                <a:cs typeface="Muli"/>
+                <a:sym typeface="Muli"/>
+              </a:rPr>
+              <a:t>Database</a:t>
+            </a:r>
+          </a:p>
+          <a:p>
+            <a:pPr marL="518610" lvl="1" indent="-259305" algn="l">
+              <a:lnSpc>
+                <a:spcPts val="3362"/>
+              </a:lnSpc>
+              <a:spcBef>
+                <a:spcPct val="0"/>
+              </a:spcBef>
+              <a:buFont typeface="Arial"/>
+              <a:buChar char="•"/>
+            </a:pPr>
+            <a:r>
+              <a:rPr lang="en-US" sz="2402" dirty="0">
+                <a:solidFill>
+                  <a:srgbClr val="305049"/>
+                </a:solidFill>
+                <a:latin typeface="Muli"/>
+                <a:ea typeface="Muli"/>
+                <a:cs typeface="Muli"/>
+                <a:sym typeface="Muli"/>
+              </a:rPr>
+              <a:t>MongoDB (NoSQL)</a:t>
+            </a:r>
+          </a:p>
+          <a:p>
+            <a:pPr algn="l">
+              <a:lnSpc>
+                <a:spcPts val="3362"/>
+              </a:lnSpc>
+              <a:spcBef>
+                <a:spcPct val="0"/>
+              </a:spcBef>
+            </a:pPr>
+            <a:endParaRPr lang="en-US" sz="2402" dirty="0">
+              <a:solidFill>
+                <a:srgbClr val="305049"/>
+              </a:solidFill>
+              <a:latin typeface="Muli"/>
+              <a:ea typeface="Muli"/>
+              <a:cs typeface="Muli"/>
+              <a:sym typeface="Muli"/>
+            </a:endParaRPr>
+          </a:p>
+          <a:p>
+            <a:pPr algn="l">
+              <a:lnSpc>
+                <a:spcPts val="3362"/>
+              </a:lnSpc>
+              <a:spcBef>
+                <a:spcPct val="0"/>
+              </a:spcBef>
+            </a:pPr>
+            <a:r>
+              <a:rPr lang="en-US" sz="2402" b="1" dirty="0">
+                <a:solidFill>
+                  <a:srgbClr val="305049"/>
+                </a:solidFill>
+                <a:latin typeface="Muli"/>
+                <a:ea typeface="Muli"/>
+                <a:cs typeface="Muli"/>
+                <a:sym typeface="Muli"/>
+              </a:rPr>
+              <a:t>Messaging</a:t>
+            </a:r>
+          </a:p>
+          <a:p>
+            <a:pPr marL="518610" lvl="1" indent="-259305" algn="l">
+              <a:lnSpc>
+                <a:spcPts val="3362"/>
+              </a:lnSpc>
+              <a:spcBef>
+                <a:spcPct val="0"/>
+              </a:spcBef>
+              <a:buFont typeface="Arial"/>
+              <a:buChar char="•"/>
+            </a:pPr>
+            <a:r>
+              <a:rPr lang="en-US" sz="2402" dirty="0">
+                <a:solidFill>
+                  <a:srgbClr val="305049"/>
+                </a:solidFill>
+                <a:latin typeface="Muli"/>
+                <a:ea typeface="Muli"/>
+                <a:cs typeface="Muli"/>
+                <a:sym typeface="Muli"/>
+              </a:rPr>
+              <a:t>RabbitMQ</a:t>
+            </a:r>
+          </a:p>
+          <a:p>
+            <a:pPr algn="l">
+              <a:lnSpc>
+                <a:spcPts val="3362"/>
+              </a:lnSpc>
+              <a:spcBef>
+                <a:spcPct val="0"/>
+              </a:spcBef>
+            </a:pPr>
+            <a:endParaRPr lang="en-US" sz="2402" dirty="0">
+              <a:solidFill>
+                <a:srgbClr val="305049"/>
+              </a:solidFill>
+              <a:latin typeface="Muli"/>
+              <a:ea typeface="Muli"/>
+              <a:cs typeface="Muli"/>
+              <a:sym typeface="Muli"/>
+            </a:endParaRPr>
+          </a:p>
+          <a:p>
+            <a:pPr algn="l">
+              <a:lnSpc>
+                <a:spcPts val="3362"/>
+              </a:lnSpc>
+              <a:spcBef>
+                <a:spcPct val="0"/>
+              </a:spcBef>
+            </a:pPr>
+            <a:r>
+              <a:rPr lang="en-US" sz="2402" b="1" dirty="0">
+                <a:solidFill>
+                  <a:srgbClr val="305049"/>
+                </a:solidFill>
+                <a:latin typeface="Muli"/>
+                <a:ea typeface="Muli"/>
+                <a:cs typeface="Muli"/>
+                <a:sym typeface="Muli"/>
+              </a:rPr>
+              <a:t>DevOps &amp; Quality</a:t>
+            </a:r>
+          </a:p>
+          <a:p>
+            <a:pPr marL="518610" lvl="1" indent="-259305" algn="l">
+              <a:lnSpc>
+                <a:spcPts val="3362"/>
+              </a:lnSpc>
+              <a:spcBef>
+                <a:spcPct val="0"/>
+              </a:spcBef>
+              <a:buFont typeface="Arial"/>
+              <a:buChar char="•"/>
+            </a:pPr>
+            <a:r>
+              <a:rPr lang="en-US" sz="2402" dirty="0">
+                <a:solidFill>
+                  <a:srgbClr val="305049"/>
+                </a:solidFill>
+                <a:latin typeface="Muli"/>
+                <a:ea typeface="Muli"/>
+                <a:cs typeface="Muli"/>
+                <a:sym typeface="Muli"/>
+              </a:rPr>
+              <a:t>Docker, Docker Compose</a:t>
+            </a:r>
+          </a:p>
+          <a:p>
+            <a:pPr marL="518610" lvl="1" indent="-259305" algn="l">
+              <a:lnSpc>
+                <a:spcPts val="3362"/>
+              </a:lnSpc>
+              <a:spcBef>
+                <a:spcPct val="0"/>
+              </a:spcBef>
+              <a:buFont typeface="Arial"/>
+              <a:buChar char="•"/>
+            </a:pPr>
+            <a:r>
+              <a:rPr lang="en-US" sz="2402" dirty="0">
+                <a:solidFill>
+                  <a:srgbClr val="305049"/>
+                </a:solidFill>
+                <a:latin typeface="Muli"/>
+                <a:ea typeface="Muli"/>
+                <a:cs typeface="Muli"/>
+                <a:sym typeface="Muli"/>
+              </a:rPr>
+              <a:t>SonarQube for code quality</a:t>
+            </a:r>
+          </a:p>
+          <a:p>
+            <a:pPr marL="518610" lvl="1" indent="-259305" algn="l">
+              <a:lnSpc>
+                <a:spcPts val="3362"/>
+              </a:lnSpc>
+              <a:spcBef>
+                <a:spcPct val="0"/>
+              </a:spcBef>
+              <a:buFont typeface="Arial"/>
+              <a:buChar char="•"/>
+            </a:pPr>
+            <a:r>
+              <a:rPr lang="en-US" sz="2402" dirty="0">
+                <a:solidFill>
+                  <a:srgbClr val="305049"/>
+                </a:solidFill>
+                <a:latin typeface="Muli"/>
+                <a:ea typeface="Muli"/>
+                <a:cs typeface="Muli"/>
+                <a:sym typeface="Muli"/>
+              </a:rPr>
+              <a:t>Jenkins Pipeline</a:t>
+            </a:r>
+          </a:p>
+          <a:p>
+            <a:pPr algn="l">
+              <a:lnSpc>
+                <a:spcPts val="3362"/>
+              </a:lnSpc>
+              <a:spcBef>
+                <a:spcPct val="0"/>
+              </a:spcBef>
+            </a:pPr>
+            <a:endParaRPr lang="en-US" sz="2402" dirty="0">
+              <a:solidFill>
+                <a:srgbClr val="305049"/>
+              </a:solidFill>
+              <a:latin typeface="Muli"/>
+              <a:ea typeface="Muli"/>
+              <a:cs typeface="Muli"/>
+              <a:sym typeface="Muli"/>
+            </a:endParaRPr>
+          </a:p>
+        </p:txBody>
+      </p:sp>
+      <p:sp>
+        <p:nvSpPr>
+          <p:cNvPr id="6" name="TextBox 6"/>
+          <p:cNvSpPr txBox="1"/>
+          <p:nvPr/>
+        </p:nvSpPr>
+        <p:spPr>
+          <a:xfrm>
+            <a:off x="5054115" y="7669769"/>
+            <a:ext cx="2547045" cy="438785"/>
+          </a:xfrm>
+          <a:prstGeom prst="rect">
+            <a:avLst/>
+          </a:prstGeom>
+        </p:spPr>
+        <p:txBody>
+          <a:bodyPr lIns="0" tIns="0" rIns="0" bIns="0" rtlCol="0" anchor="t">
+            <a:spAutoFit/>
+          </a:bodyPr>
+          <a:lstStyle/>
+          <a:p>
+            <a:pPr algn="ctr">
+              <a:lnSpc>
+                <a:spcPts val="3639"/>
+              </a:lnSpc>
+              <a:spcBef>
+                <a:spcPct val="0"/>
+              </a:spcBef>
+            </a:pPr>
+            <a:r>
+              <a:rPr lang="en-US" sz="2599" b="1">
+                <a:solidFill>
+                  <a:srgbClr val="305049"/>
+                </a:solidFill>
+                <a:latin typeface="Muli Bold"/>
+                <a:ea typeface="Muli Bold"/>
+                <a:cs typeface="Muli Bold"/>
+                <a:sym typeface="Muli Bold"/>
+              </a:rPr>
+              <a:t>Why MongoDB?</a:t>
+            </a:r>
+          </a:p>
+        </p:txBody>
+      </p:sp>
+      <p:sp>
+        <p:nvSpPr>
+          <p:cNvPr id="7" name="TextBox 7"/>
+          <p:cNvSpPr txBox="1"/>
+          <p:nvPr/>
+        </p:nvSpPr>
+        <p:spPr>
+          <a:xfrm>
+            <a:off x="8281690" y="7043659"/>
+            <a:ext cx="9175322" cy="2920365"/>
+          </a:xfrm>
+          <a:prstGeom prst="rect">
+            <a:avLst/>
+          </a:prstGeom>
+        </p:spPr>
+        <p:txBody>
+          <a:bodyPr lIns="0" tIns="0" rIns="0" bIns="0" rtlCol="0" anchor="t">
+            <a:spAutoFit/>
+          </a:bodyPr>
+          <a:lstStyle/>
+          <a:p>
+            <a:pPr algn="l">
+              <a:lnSpc>
+                <a:spcPts val="3359"/>
+              </a:lnSpc>
+              <a:spcBef>
+                <a:spcPct val="0"/>
+              </a:spcBef>
+            </a:pPr>
+            <a:r>
+              <a:rPr lang="en-US" sz="2400" b="1">
+                <a:solidFill>
+                  <a:srgbClr val="305049"/>
+                </a:solidFill>
+                <a:latin typeface="Muli Bold"/>
+                <a:ea typeface="Muli Bold"/>
+                <a:cs typeface="Muli Bold"/>
+                <a:sym typeface="Muli Bold"/>
+              </a:rPr>
+              <a:t>Schema-flexible:</a:t>
+            </a:r>
+            <a:r>
+              <a:rPr lang="en-US" sz="2400">
+                <a:solidFill>
+                  <a:srgbClr val="305049"/>
+                </a:solidFill>
+                <a:latin typeface="Muli"/>
+                <a:ea typeface="Muli"/>
+                <a:cs typeface="Muli"/>
+                <a:sym typeface="Muli"/>
+              </a:rPr>
+              <a:t> Easily handles evolving data models</a:t>
+            </a:r>
+          </a:p>
+          <a:p>
+            <a:pPr algn="l">
+              <a:lnSpc>
+                <a:spcPts val="3359"/>
+              </a:lnSpc>
+              <a:spcBef>
+                <a:spcPct val="0"/>
+              </a:spcBef>
+            </a:pPr>
+            <a:r>
+              <a:rPr lang="en-US" sz="2400" b="1">
+                <a:solidFill>
+                  <a:srgbClr val="305049"/>
+                </a:solidFill>
+                <a:latin typeface="Muli Bold"/>
+                <a:ea typeface="Muli Bold"/>
+                <a:cs typeface="Muli Bold"/>
+                <a:sym typeface="Muli Bold"/>
+              </a:rPr>
+              <a:t>Document-centric data model:</a:t>
+            </a:r>
+            <a:r>
+              <a:rPr lang="en-US" sz="2400">
+                <a:solidFill>
+                  <a:srgbClr val="305049"/>
+                </a:solidFill>
+                <a:latin typeface="Muli"/>
+                <a:ea typeface="Muli"/>
+                <a:cs typeface="Muli"/>
+                <a:sym typeface="Muli"/>
+              </a:rPr>
+              <a:t> Ideal for nested JSON-like data used in microservices</a:t>
+            </a:r>
+          </a:p>
+          <a:p>
+            <a:pPr algn="l">
+              <a:lnSpc>
+                <a:spcPts val="3359"/>
+              </a:lnSpc>
+              <a:spcBef>
+                <a:spcPct val="0"/>
+              </a:spcBef>
+            </a:pPr>
+            <a:r>
+              <a:rPr lang="en-US" sz="2400" b="1">
+                <a:solidFill>
+                  <a:srgbClr val="305049"/>
+                </a:solidFill>
+                <a:latin typeface="Muli Bold"/>
+                <a:ea typeface="Muli Bold"/>
+                <a:cs typeface="Muli Bold"/>
+                <a:sym typeface="Muli Bold"/>
+              </a:rPr>
+              <a:t>High performance:</a:t>
+            </a:r>
+            <a:r>
+              <a:rPr lang="en-US" sz="2400">
+                <a:solidFill>
+                  <a:srgbClr val="305049"/>
+                </a:solidFill>
+                <a:latin typeface="Muli"/>
+                <a:ea typeface="Muli"/>
+                <a:cs typeface="Muli"/>
+                <a:sym typeface="Muli"/>
+              </a:rPr>
+              <a:t> Fast read/write operations</a:t>
+            </a:r>
+          </a:p>
+          <a:p>
+            <a:pPr algn="l">
+              <a:lnSpc>
+                <a:spcPts val="3359"/>
+              </a:lnSpc>
+              <a:spcBef>
+                <a:spcPct val="0"/>
+              </a:spcBef>
+            </a:pPr>
+            <a:r>
+              <a:rPr lang="en-US" sz="2400" b="1">
+                <a:solidFill>
+                  <a:srgbClr val="305049"/>
+                </a:solidFill>
+                <a:latin typeface="Muli Bold"/>
+                <a:ea typeface="Muli Bold"/>
+                <a:cs typeface="Muli Bold"/>
+                <a:sym typeface="Muli Bold"/>
+              </a:rPr>
+              <a:t>Scalability:</a:t>
+            </a:r>
+            <a:r>
+              <a:rPr lang="en-US" sz="2400">
+                <a:solidFill>
+                  <a:srgbClr val="305049"/>
+                </a:solidFill>
+                <a:latin typeface="Muli"/>
+                <a:ea typeface="Muli"/>
+                <a:cs typeface="Muli"/>
+                <a:sym typeface="Muli"/>
+              </a:rPr>
+              <a:t> Supports horizontal scaling for growing data</a:t>
+            </a:r>
+          </a:p>
+          <a:p>
+            <a:pPr algn="l">
+              <a:lnSpc>
+                <a:spcPts val="3359"/>
+              </a:lnSpc>
+              <a:spcBef>
+                <a:spcPct val="0"/>
+              </a:spcBef>
+            </a:pPr>
+            <a:r>
+              <a:rPr lang="en-US" sz="2400" b="1">
+                <a:solidFill>
+                  <a:srgbClr val="305049"/>
+                </a:solidFill>
+                <a:latin typeface="Muli Bold"/>
+                <a:ea typeface="Muli Bold"/>
+                <a:cs typeface="Muli Bold"/>
+                <a:sym typeface="Muli Bold"/>
+              </a:rPr>
+              <a:t>Microservice-Friendly Data Isolation:</a:t>
+            </a:r>
+            <a:r>
+              <a:rPr lang="en-US" sz="2400">
+                <a:solidFill>
+                  <a:srgbClr val="305049"/>
+                </a:solidFill>
+                <a:latin typeface="Muli"/>
+                <a:ea typeface="Muli"/>
+                <a:cs typeface="Muli"/>
+                <a:sym typeface="Muli"/>
+              </a:rPr>
+              <a:t> Each microservice maintains its own database hence loose coupling</a:t>
+            </a:r>
+          </a:p>
+        </p:txBody>
+      </p:sp>
+    </p:spTree>
+  </p:cSld>
+  <p:clrMapOvr>
+    <a:masterClrMapping/>
+  </p:clrMapOvr>
+</p:sld>
+</file>
+
+<file path=ppt/slides/slide14.xml><?xml version="1.0" encoding="utf-8"?>
+<p:sld xmlns:a="http://schemas.openxmlformats.org/drawingml/2006/main" xmlns:r="http://schemas.openxmlformats.org/officeDocument/2006/relationships" xmlns:p="http://schemas.openxmlformats.org/presentationml/2006/main">
+  <p:cSld>
+    <p:bg>
+      <p:bgPr>
+        <a:solidFill>
+          <a:srgbClr val="305049"/>
+        </a:solidFill>
+        <a:effectLst/>
+      </p:bgPr>
+    </p:bg>
+    <p:spTree>
+      <p:nvGrpSpPr>
+        <p:cNvPr id="1" name=""/>
+        <p:cNvGrpSpPr/>
+        <p:nvPr/>
+      </p:nvGrpSpPr>
+      <p:grpSpPr>
+        <a:xfrm>
+          <a:off x="0" y="0"/>
+          <a:ext cx="0" cy="0"/>
+          <a:chOff x="0" y="0"/>
+          <a:chExt cx="0" cy="0"/>
+        </a:xfrm>
+      </p:grpSpPr>
+      <p:sp>
+        <p:nvSpPr>
+          <p:cNvPr id="2" name="Freeform 2"/>
+          <p:cNvSpPr/>
+          <p:nvPr/>
+        </p:nvSpPr>
+        <p:spPr>
+          <a:xfrm rot="-5400000">
+            <a:off x="646990" y="1029320"/>
+            <a:ext cx="1526842" cy="763421"/>
+          </a:xfrm>
+          <a:custGeom>
+            <a:avLst/>
+            <a:gdLst/>
+            <a:ahLst/>
+            <a:cxnLst/>
+            <a:rect l="l" t="t" r="r" b="b"/>
+            <a:pathLst>
+              <a:path w="1526842" h="763421">
+                <a:moveTo>
+                  <a:pt x="0" y="0"/>
+                </a:moveTo>
+                <a:lnTo>
+                  <a:pt x="1526841" y="0"/>
+                </a:lnTo>
+                <a:lnTo>
+                  <a:pt x="1526841" y="763420"/>
+                </a:lnTo>
+                <a:lnTo>
+                  <a:pt x="0" y="763420"/>
+                </a:lnTo>
+                <a:lnTo>
+                  <a:pt x="0" y="0"/>
+                </a:lnTo>
+                <a:close/>
+              </a:path>
+            </a:pathLst>
+          </a:custGeom>
+          <a:blipFill>
+            <a:blip r:embed="rId2">
+              <a:extLst>
+                <a:ext uri="{96DAC541-7B7A-43D3-8B79-37D633B846F1}">
+                  <asvg:svgBlip xmlns:asvg="http://schemas.microsoft.com/office/drawing/2016/SVG/main" r:embed="rId3"/>
+                </a:ext>
+              </a:extLst>
+            </a:blip>
+            <a:stretch>
+              <a:fillRect/>
+            </a:stretch>
+          </a:blipFill>
+        </p:spPr>
+      </p:sp>
+      <p:sp>
+        <p:nvSpPr>
+          <p:cNvPr id="3" name="TextBox 3"/>
+          <p:cNvSpPr txBox="1"/>
+          <p:nvPr/>
+        </p:nvSpPr>
+        <p:spPr>
+          <a:xfrm>
+            <a:off x="2292438" y="704759"/>
+            <a:ext cx="10024736" cy="909955"/>
+          </a:xfrm>
+          <a:prstGeom prst="rect">
+            <a:avLst/>
+          </a:prstGeom>
+        </p:spPr>
+        <p:txBody>
+          <a:bodyPr lIns="0" tIns="0" rIns="0" bIns="0" rtlCol="0" anchor="t">
+            <a:spAutoFit/>
+          </a:bodyPr>
+          <a:lstStyle/>
+          <a:p>
+            <a:pPr algn="l">
+              <a:lnSpc>
+                <a:spcPts val="7039"/>
+              </a:lnSpc>
+            </a:pPr>
+            <a:r>
+              <a:rPr lang="en-US" sz="6399" b="1">
+                <a:solidFill>
+                  <a:srgbClr val="EFD1A9"/>
+                </a:solidFill>
+                <a:latin typeface="Muli Heavy"/>
+                <a:ea typeface="Muli Heavy"/>
+                <a:cs typeface="Muli Heavy"/>
+                <a:sym typeface="Muli Heavy"/>
+              </a:rPr>
+              <a:t>Key Features</a:t>
+            </a:r>
+          </a:p>
+        </p:txBody>
+      </p:sp>
+      <p:sp>
+        <p:nvSpPr>
+          <p:cNvPr id="4" name="TextBox 4"/>
+          <p:cNvSpPr txBox="1"/>
+          <p:nvPr/>
+        </p:nvSpPr>
+        <p:spPr>
+          <a:xfrm>
+            <a:off x="2163499" y="2117301"/>
+            <a:ext cx="10915328" cy="2418186"/>
+          </a:xfrm>
+          <a:prstGeom prst="rect">
+            <a:avLst/>
+          </a:prstGeom>
+        </p:spPr>
+        <p:txBody>
+          <a:bodyPr lIns="0" tIns="0" rIns="0" bIns="0" rtlCol="0" anchor="t">
+            <a:spAutoFit/>
+          </a:bodyPr>
+          <a:lstStyle/>
+          <a:p>
+            <a:pPr marL="597665" lvl="1" indent="-298832" algn="l">
+              <a:lnSpc>
+                <a:spcPts val="3875"/>
+              </a:lnSpc>
+              <a:spcBef>
+                <a:spcPct val="0"/>
+              </a:spcBef>
+              <a:buFont typeface="Arial"/>
+              <a:buChar char="•"/>
+            </a:pPr>
+            <a:r>
+              <a:rPr lang="en-US" sz="2768">
+                <a:solidFill>
+                  <a:srgbClr val="F1EEEE"/>
+                </a:solidFill>
+                <a:latin typeface="Muli"/>
+                <a:ea typeface="Muli"/>
+                <a:cs typeface="Muli"/>
+                <a:sym typeface="Muli"/>
+              </a:rPr>
+              <a:t>Role-based dashboards (Customer, Technician, Admin)</a:t>
+            </a:r>
+          </a:p>
+          <a:p>
+            <a:pPr marL="597665" lvl="1" indent="-298832" algn="l">
+              <a:lnSpc>
+                <a:spcPts val="3875"/>
+              </a:lnSpc>
+              <a:spcBef>
+                <a:spcPct val="0"/>
+              </a:spcBef>
+              <a:buFont typeface="Arial"/>
+              <a:buChar char="•"/>
+            </a:pPr>
+            <a:r>
+              <a:rPr lang="en-US" sz="2768">
+                <a:solidFill>
+                  <a:srgbClr val="F1EEEE"/>
+                </a:solidFill>
+                <a:latin typeface="Muli"/>
+                <a:ea typeface="Muli"/>
+                <a:cs typeface="Muli"/>
+                <a:sym typeface="Muli"/>
+              </a:rPr>
+              <a:t>Real-time email notifications</a:t>
+            </a:r>
+          </a:p>
+          <a:p>
+            <a:pPr marL="597665" lvl="1" indent="-298832" algn="l">
+              <a:lnSpc>
+                <a:spcPts val="3875"/>
+              </a:lnSpc>
+              <a:spcBef>
+                <a:spcPct val="0"/>
+              </a:spcBef>
+              <a:buFont typeface="Arial"/>
+              <a:buChar char="•"/>
+            </a:pPr>
+            <a:r>
+              <a:rPr lang="en-US" sz="2768">
+                <a:solidFill>
+                  <a:srgbClr val="F1EEEE"/>
+                </a:solidFill>
+                <a:latin typeface="Muli"/>
+                <a:ea typeface="Muli"/>
+                <a:cs typeface="Muli"/>
+                <a:sym typeface="Muli"/>
+              </a:rPr>
+              <a:t>Modular microservices architecture</a:t>
+            </a:r>
+          </a:p>
+          <a:p>
+            <a:pPr marL="597665" lvl="1" indent="-298832" algn="l">
+              <a:lnSpc>
+                <a:spcPts val="3875"/>
+              </a:lnSpc>
+              <a:spcBef>
+                <a:spcPct val="0"/>
+              </a:spcBef>
+              <a:buFont typeface="Arial"/>
+              <a:buChar char="•"/>
+            </a:pPr>
+            <a:r>
+              <a:rPr lang="en-US" sz="2768">
+                <a:solidFill>
+                  <a:srgbClr val="F1EEEE"/>
+                </a:solidFill>
+                <a:latin typeface="Muli"/>
+                <a:ea typeface="Muli"/>
+                <a:cs typeface="Muli"/>
+                <a:sym typeface="Muli"/>
+              </a:rPr>
+              <a:t>Clean UI with modern design</a:t>
+            </a:r>
+          </a:p>
+          <a:p>
+            <a:pPr marL="597665" lvl="1" indent="-298832" algn="l">
+              <a:lnSpc>
+                <a:spcPts val="3875"/>
+              </a:lnSpc>
+              <a:spcBef>
+                <a:spcPct val="0"/>
+              </a:spcBef>
+              <a:buFont typeface="Arial"/>
+              <a:buChar char="•"/>
+            </a:pPr>
+            <a:r>
+              <a:rPr lang="en-US" sz="2768">
+                <a:solidFill>
+                  <a:srgbClr val="F1EEEE"/>
+                </a:solidFill>
+                <a:latin typeface="Muli"/>
+                <a:ea typeface="Muli"/>
+                <a:cs typeface="Muli"/>
+                <a:sym typeface="Muli"/>
+              </a:rPr>
+              <a:t>Scalable and maintainable backend</a:t>
+            </a:r>
+          </a:p>
+        </p:txBody>
+      </p:sp>
+      <p:sp>
+        <p:nvSpPr>
+          <p:cNvPr id="5" name="Freeform 5"/>
+          <p:cNvSpPr/>
+          <p:nvPr/>
+        </p:nvSpPr>
+        <p:spPr>
+          <a:xfrm rot="-10800000">
+            <a:off x="-2292062" y="6785816"/>
+            <a:ext cx="7064180" cy="3532090"/>
+          </a:xfrm>
+          <a:custGeom>
+            <a:avLst/>
+            <a:gdLst/>
+            <a:ahLst/>
+            <a:cxnLst/>
+            <a:rect l="l" t="t" r="r" b="b"/>
+            <a:pathLst>
+              <a:path w="7064180" h="3532090">
+                <a:moveTo>
+                  <a:pt x="0" y="0"/>
+                </a:moveTo>
+                <a:lnTo>
+                  <a:pt x="7064180" y="0"/>
+                </a:lnTo>
+                <a:lnTo>
+                  <a:pt x="7064180" y="3532090"/>
+                </a:lnTo>
+                <a:lnTo>
+                  <a:pt x="0" y="3532090"/>
+                </a:lnTo>
+                <a:lnTo>
+                  <a:pt x="0" y="0"/>
+                </a:lnTo>
+                <a:close/>
+              </a:path>
+            </a:pathLst>
+          </a:custGeom>
+          <a:blipFill>
+            <a:blip r:embed="rId4">
+              <a:extLst>
+                <a:ext uri="{96DAC541-7B7A-43D3-8B79-37D633B846F1}">
+                  <asvg:svgBlip xmlns:asvg="http://schemas.microsoft.com/office/drawing/2016/SVG/main" r:embed="rId5"/>
+                </a:ext>
+              </a:extLst>
+            </a:blip>
+            <a:stretch>
+              <a:fillRect/>
+            </a:stretch>
+          </a:blipFill>
+        </p:spPr>
+      </p:sp>
+      <p:sp>
+        <p:nvSpPr>
+          <p:cNvPr id="6" name="TextBox 6"/>
+          <p:cNvSpPr txBox="1"/>
+          <p:nvPr/>
+        </p:nvSpPr>
+        <p:spPr>
+          <a:xfrm>
+            <a:off x="7621163" y="5200650"/>
+            <a:ext cx="9638137" cy="909955"/>
+          </a:xfrm>
+          <a:prstGeom prst="rect">
+            <a:avLst/>
+          </a:prstGeom>
+        </p:spPr>
+        <p:txBody>
+          <a:bodyPr lIns="0" tIns="0" rIns="0" bIns="0" rtlCol="0" anchor="t">
+            <a:spAutoFit/>
+          </a:bodyPr>
+          <a:lstStyle/>
+          <a:p>
+            <a:pPr algn="l">
+              <a:lnSpc>
+                <a:spcPts val="7039"/>
+              </a:lnSpc>
+            </a:pPr>
+            <a:r>
+              <a:rPr lang="en-US" sz="6399" b="1" dirty="0">
+                <a:solidFill>
+                  <a:srgbClr val="EFD1A9"/>
+                </a:solidFill>
+                <a:latin typeface="Muli Heavy"/>
+                <a:ea typeface="Muli Heavy"/>
+                <a:cs typeface="Muli Heavy"/>
+                <a:sym typeface="Muli Heavy"/>
+              </a:rPr>
+              <a:t>Challenges &amp; Learnings </a:t>
+            </a:r>
+          </a:p>
+        </p:txBody>
+      </p:sp>
+      <p:sp>
+        <p:nvSpPr>
+          <p:cNvPr id="7" name="TextBox 7"/>
+          <p:cNvSpPr txBox="1"/>
+          <p:nvPr/>
+        </p:nvSpPr>
+        <p:spPr>
+          <a:xfrm>
+            <a:off x="9152138" y="6325173"/>
+            <a:ext cx="8107162" cy="1931916"/>
+          </a:xfrm>
+          <a:prstGeom prst="rect">
+            <a:avLst/>
+          </a:prstGeom>
+        </p:spPr>
+        <p:txBody>
+          <a:bodyPr lIns="0" tIns="0" rIns="0" bIns="0" rtlCol="0" anchor="t">
+            <a:spAutoFit/>
+          </a:bodyPr>
+          <a:lstStyle/>
+          <a:p>
+            <a:pPr marL="597665" lvl="1" indent="-298832" algn="l">
+              <a:lnSpc>
+                <a:spcPts val="3875"/>
+              </a:lnSpc>
+              <a:spcBef>
+                <a:spcPct val="0"/>
+              </a:spcBef>
+              <a:buFont typeface="Arial"/>
+              <a:buChar char="•"/>
+            </a:pPr>
+            <a:r>
+              <a:rPr lang="en-US" sz="2768" dirty="0">
+                <a:solidFill>
+                  <a:srgbClr val="F1EEEE"/>
+                </a:solidFill>
+                <a:latin typeface="Muli"/>
+                <a:ea typeface="Muli"/>
+                <a:cs typeface="Muli"/>
+                <a:sym typeface="Muli"/>
+              </a:rPr>
+              <a:t>Handling service-to-service communication</a:t>
+            </a:r>
+          </a:p>
+          <a:p>
+            <a:pPr marL="597665" lvl="1" indent="-298832" algn="l">
+              <a:lnSpc>
+                <a:spcPts val="3875"/>
+              </a:lnSpc>
+              <a:spcBef>
+                <a:spcPct val="0"/>
+              </a:spcBef>
+              <a:buFont typeface="Arial"/>
+              <a:buChar char="•"/>
+            </a:pPr>
+            <a:r>
+              <a:rPr lang="en-US" sz="2768" dirty="0">
+                <a:solidFill>
+                  <a:srgbClr val="F1EEEE"/>
+                </a:solidFill>
+                <a:latin typeface="Muli"/>
+                <a:ea typeface="Muli"/>
+                <a:cs typeface="Muli"/>
+                <a:sym typeface="Muli"/>
+              </a:rPr>
+              <a:t>Designing scalable microservices</a:t>
+            </a:r>
+          </a:p>
+          <a:p>
+            <a:pPr marL="597665" lvl="1" indent="-298832" algn="l">
+              <a:lnSpc>
+                <a:spcPts val="3875"/>
+              </a:lnSpc>
+              <a:spcBef>
+                <a:spcPct val="0"/>
+              </a:spcBef>
+              <a:buFont typeface="Arial"/>
+              <a:buChar char="•"/>
+            </a:pPr>
+            <a:r>
+              <a:rPr lang="en-US" sz="2768" dirty="0">
+                <a:solidFill>
+                  <a:srgbClr val="F1EEEE"/>
+                </a:solidFill>
+                <a:latin typeface="Muli"/>
+                <a:ea typeface="Muli"/>
+                <a:cs typeface="Muli"/>
+                <a:sym typeface="Muli"/>
+              </a:rPr>
+              <a:t>Integrating the frontend &amp; the backend</a:t>
+            </a:r>
+          </a:p>
+          <a:p>
+            <a:pPr marL="597665" lvl="1" indent="-298832" algn="l">
+              <a:lnSpc>
+                <a:spcPts val="3875"/>
+              </a:lnSpc>
+              <a:spcBef>
+                <a:spcPct val="0"/>
+              </a:spcBef>
+              <a:buFont typeface="Arial"/>
+              <a:buChar char="•"/>
+            </a:pPr>
+            <a:r>
+              <a:rPr lang="en-US" sz="2768" dirty="0">
+                <a:solidFill>
+                  <a:srgbClr val="F1EEEE"/>
+                </a:solidFill>
+                <a:latin typeface="Muli"/>
+                <a:ea typeface="Muli"/>
+                <a:cs typeface="Muli"/>
+                <a:sym typeface="Muli"/>
+              </a:rPr>
+              <a:t>Ensuring UI responsiveness and performance</a:t>
+            </a:r>
+          </a:p>
+        </p:txBody>
+      </p:sp>
+    </p:spTree>
+  </p:cSld>
+  <p:clrMapOvr>
+    <a:masterClrMapping/>
+  </p:clrMapOvr>
+</p:sld>
+</file>
+
+<file path=ppt/slides/slide15.xml><?xml version="1.0" encoding="utf-8"?>
+<p:sld xmlns:a="http://schemas.openxmlformats.org/drawingml/2006/main" xmlns:r="http://schemas.openxmlformats.org/officeDocument/2006/relationships" xmlns:p="http://schemas.openxmlformats.org/presentationml/2006/main">
+  <p:cSld>
     <p:bg>
       <p:bgPr>
         <a:solidFill>
@@ -3851,7 +5625,7 @@
 </p:sld>
 </file>
 
-<file path=ppt/slides/slide11.xml><?xml version="1.0" encoding="utf-8"?>
+<file path=ppt/slides/slide16.xml><?xml version="1.0" encoding="utf-8"?>
 <p:sld xmlns:a="http://schemas.openxmlformats.org/drawingml/2006/main" xmlns:r="http://schemas.openxmlformats.org/officeDocument/2006/relationships" xmlns:p="http://schemas.openxmlformats.org/presentationml/2006/main">
   <p:cSld>
     <p:bg>
@@ -5525,7 +7299,7 @@
         <p:spPr>
           <a:xfrm>
             <a:off x="2055511" y="2519198"/>
-            <a:ext cx="15203789" cy="6559648"/>
+            <a:ext cx="15203789" cy="7554504"/>
           </a:xfrm>
           <a:prstGeom prst="rect">
             <a:avLst/>
@@ -5887,6 +7661,56 @@
               </a:rPr>
               <a:t>– Sends email updates via RabbitMQ</a:t>
             </a:r>
+          </a:p>
+          <a:p>
+            <a:pPr algn="l">
+              <a:lnSpc>
+                <a:spcPts val="3714"/>
+              </a:lnSpc>
+              <a:spcBef>
+                <a:spcPct val="0"/>
+              </a:spcBef>
+            </a:pPr>
+            <a:endParaRPr lang="en-US" sz="2652" dirty="0">
+              <a:solidFill>
+                <a:srgbClr val="F1EEEE"/>
+              </a:solidFill>
+              <a:latin typeface="Muli"/>
+              <a:ea typeface="Muli"/>
+              <a:cs typeface="Muli"/>
+              <a:sym typeface="Muli"/>
+            </a:endParaRPr>
+          </a:p>
+          <a:p>
+            <a:pPr algn="l">
+              <a:lnSpc>
+                <a:spcPts val="3714"/>
+              </a:lnSpc>
+              <a:spcBef>
+                <a:spcPct val="0"/>
+              </a:spcBef>
+            </a:pPr>
+            <a:r>
+              <a:rPr lang="en-US" sz="2652">
+                <a:solidFill>
+                  <a:srgbClr val="F1EEEE"/>
+                </a:solidFill>
+                <a:latin typeface="Muli"/>
+                <a:ea typeface="Muli"/>
+                <a:cs typeface="Muli"/>
+                <a:sym typeface="Muli"/>
+              </a:rPr>
+              <a:t>(Eureka Server &amp; Config Server)</a:t>
+            </a:r>
+            <a:endParaRPr lang="en-US" sz="2652" dirty="0">
+              <a:solidFill>
+                <a:srgbClr val="F1EEEE"/>
+              </a:solidFill>
+              <a:latin typeface="Muli"/>
+              <a:ea typeface="Muli"/>
+              <a:cs typeface="Muli"/>
+              <a:sym typeface="Muli"/>
+            </a:endParaRPr>
           </a:p>
           <a:p>
             <a:pPr algn="l">
@@ -6092,14 +7916,6 @@
 <file path=ppt/slides/slide6.xml><?xml version="1.0" encoding="utf-8"?>
 <p:sld xmlns:a="http://schemas.openxmlformats.org/drawingml/2006/main" xmlns:r="http://schemas.openxmlformats.org/officeDocument/2006/relationships" xmlns:p="http://schemas.openxmlformats.org/presentationml/2006/main">
   <p:cSld>
-    <p:bg>
-      <p:bgPr>
-        <a:solidFill>
-          <a:srgbClr val="F1EEEE"/>
-        </a:solidFill>
-        <a:effectLst/>
-      </p:bgPr>
-    </p:bg>
     <p:spTree>
       <p:nvGrpSpPr>
         <p:cNvPr id="1" name=""/>
@@ -6114,97 +7930,48 @@
           <a:chExt cx="0" cy="0"/>
         </a:xfrm>
       </p:grpSpPr>
-      <p:sp>
-        <p:nvSpPr>
-          <p:cNvPr id="2" name="Freeform 2"/>
-          <p:cNvSpPr/>
+      <p:pic>
+        <p:nvPicPr>
+          <p:cNvPr id="3" name="Picture 2">
+            <a:extLst>
+              <a:ext uri="{FF2B5EF4-FFF2-40B4-BE49-F238E27FC236}">
+                <a16:creationId xmlns:a16="http://schemas.microsoft.com/office/drawing/2014/main" id="{ACB22E30-59B0-0389-6569-48A646FB1B1C}"/>
+              </a:ext>
+            </a:extLst>
+          </p:cNvPr>
+          <p:cNvPicPr>
+            <a:picLocks noChangeAspect="1"/>
+          </p:cNvPicPr>
           <p:nvPr/>
-        </p:nvSpPr>
+        </p:nvPicPr>
+        <p:blipFill>
+          <a:blip r:embed="rId2">
+            <a:extLst>
+              <a:ext uri="{28A0092B-C50C-407E-A947-70E740481C1C}">
+                <a14:useLocalDpi xmlns:a14="http://schemas.microsoft.com/office/drawing/2010/main" val="0"/>
+              </a:ext>
+            </a:extLst>
+          </a:blip>
+          <a:stretch>
+            <a:fillRect/>
+          </a:stretch>
+        </p:blipFill>
         <p:spPr>
           <a:xfrm>
-            <a:off x="0" y="91440"/>
-            <a:ext cx="18288000" cy="9166860"/>
-          </a:xfrm>
-          <a:custGeom>
-            <a:avLst/>
-            <a:gdLst/>
-            <a:ahLst/>
-            <a:cxnLst/>
-            <a:rect l="l" t="t" r="r" b="b"/>
-            <a:pathLst>
-              <a:path w="18288000" h="9166860">
-                <a:moveTo>
-                  <a:pt x="0" y="0"/>
-                </a:moveTo>
-                <a:lnTo>
-                  <a:pt x="18288000" y="0"/>
-                </a:lnTo>
-                <a:lnTo>
-                  <a:pt x="18288000" y="9166860"/>
-                </a:lnTo>
-                <a:lnTo>
-                  <a:pt x="0" y="9166860"/>
-                </a:lnTo>
-                <a:lnTo>
-                  <a:pt x="0" y="0"/>
-                </a:lnTo>
-                <a:close/>
-              </a:path>
-            </a:pathLst>
-          </a:custGeom>
-          <a:blipFill>
-            <a:blip r:embed="rId2"/>
-            <a:stretch>
-              <a:fillRect/>
-            </a:stretch>
-          </a:blipFill>
-        </p:spPr>
-      </p:sp>
-      <p:sp>
-        <p:nvSpPr>
-          <p:cNvPr id="3" name="TextBox 3"/>
-          <p:cNvSpPr txBox="1"/>
-          <p:nvPr/>
-        </p:nvSpPr>
-        <p:spPr>
-          <a:xfrm>
-            <a:off x="4815564" y="9458654"/>
-            <a:ext cx="7544007" cy="828346"/>
+            <a:off x="5105400" y="68519"/>
+            <a:ext cx="7653337" cy="10194367"/>
           </a:xfrm>
           <a:prstGeom prst="rect">
             <a:avLst/>
           </a:prstGeom>
         </p:spPr>
-        <p:txBody>
-          <a:bodyPr lIns="0" tIns="0" rIns="0" bIns="0" rtlCol="0" anchor="t">
-            <a:spAutoFit/>
-          </a:bodyPr>
-          <a:lstStyle/>
-          <a:p>
-            <a:pPr algn="ctr">
-              <a:lnSpc>
-                <a:spcPts val="6881"/>
-              </a:lnSpc>
-              <a:spcBef>
-                <a:spcPct val="0"/>
-              </a:spcBef>
-            </a:pPr>
-            <a:r>
-              <a:rPr lang="en-US" sz="4915" b="1">
-                <a:solidFill>
-                  <a:srgbClr val="000000"/>
-                </a:solidFill>
-                <a:latin typeface="Muli Bold"/>
-                <a:ea typeface="Muli Bold"/>
-                <a:cs typeface="Muli Bold"/>
-                <a:sym typeface="Muli Bold"/>
-              </a:rPr>
-              <a:t>Website Landing Page UI</a:t>
-            </a:r>
-          </a:p>
-        </p:txBody>
-      </p:sp>
+      </p:pic>
     </p:spTree>
+    <p:extLst>
+      <p:ext uri="{BB962C8B-B14F-4D97-AF65-F5344CB8AC3E}">
+        <p14:creationId xmlns:p14="http://schemas.microsoft.com/office/powerpoint/2010/main" val="627292517"/>
+      </p:ext>
+    </p:extLst>
   </p:cSld>
   <p:clrMapOvr>
     <a:masterClrMapping/>
@@ -6215,14 +7982,6 @@
 <file path=ppt/slides/slide7.xml><?xml version="1.0" encoding="utf-8"?>
 <p:sld xmlns:a="http://schemas.openxmlformats.org/drawingml/2006/main" xmlns:r="http://schemas.openxmlformats.org/officeDocument/2006/relationships" xmlns:p="http://schemas.openxmlformats.org/presentationml/2006/main">
   <p:cSld>
-    <p:bg>
-      <p:bgPr>
-        <a:solidFill>
-          <a:srgbClr val="F1EEEE"/>
-        </a:solidFill>
-        <a:effectLst/>
-      </p:bgPr>
-    </p:bg>
     <p:spTree>
       <p:nvGrpSpPr>
         <p:cNvPr id="1" name=""/>
@@ -6237,227 +7996,84 @@
           <a:chExt cx="0" cy="0"/>
         </a:xfrm>
       </p:grpSpPr>
-      <p:sp>
-        <p:nvSpPr>
-          <p:cNvPr id="2" name="Freeform 2"/>
-          <p:cNvSpPr/>
+      <p:pic>
+        <p:nvPicPr>
+          <p:cNvPr id="3" name="Picture 2">
+            <a:extLst>
+              <a:ext uri="{FF2B5EF4-FFF2-40B4-BE49-F238E27FC236}">
+                <a16:creationId xmlns:a16="http://schemas.microsoft.com/office/drawing/2014/main" id="{2D8BA5D8-38FD-A1C4-4FC3-49A8D5E565C0}"/>
+              </a:ext>
+            </a:extLst>
+          </p:cNvPr>
+          <p:cNvPicPr>
+            <a:picLocks noChangeAspect="1"/>
+          </p:cNvPicPr>
           <p:nvPr/>
-        </p:nvSpPr>
+        </p:nvPicPr>
+        <p:blipFill>
+          <a:blip r:embed="rId2">
+            <a:extLst>
+              <a:ext uri="{28A0092B-C50C-407E-A947-70E740481C1C}">
+                <a14:useLocalDpi xmlns:a14="http://schemas.microsoft.com/office/drawing/2010/main" val="0"/>
+              </a:ext>
+            </a:extLst>
+          </a:blip>
+          <a:stretch>
+            <a:fillRect/>
+          </a:stretch>
+        </p:blipFill>
         <p:spPr>
           <a:xfrm>
-            <a:off x="0" y="0"/>
-            <a:ext cx="16863934" cy="10287000"/>
-          </a:xfrm>
-          <a:custGeom>
-            <a:avLst/>
-            <a:gdLst/>
-            <a:ahLst/>
-            <a:cxnLst/>
-            <a:rect l="l" t="t" r="r" b="b"/>
-            <a:pathLst>
-              <a:path w="16863934" h="10287000">
-                <a:moveTo>
-                  <a:pt x="0" y="0"/>
-                </a:moveTo>
-                <a:lnTo>
-                  <a:pt x="16863934" y="0"/>
-                </a:lnTo>
-                <a:lnTo>
-                  <a:pt x="16863934" y="10287000"/>
-                </a:lnTo>
-                <a:lnTo>
-                  <a:pt x="0" y="10287000"/>
-                </a:lnTo>
-                <a:lnTo>
-                  <a:pt x="0" y="0"/>
-                </a:lnTo>
-                <a:close/>
-              </a:path>
-            </a:pathLst>
-          </a:custGeom>
-          <a:blipFill>
-            <a:blip r:embed="rId2"/>
-            <a:stretch>
-              <a:fillRect/>
-            </a:stretch>
-          </a:blipFill>
-        </p:spPr>
-      </p:sp>
-      <p:sp>
-        <p:nvSpPr>
-          <p:cNvPr id="3" name="TextBox 3"/>
-          <p:cNvSpPr txBox="1"/>
-          <p:nvPr/>
-        </p:nvSpPr>
-        <p:spPr>
-          <a:xfrm>
-            <a:off x="16863934" y="9525"/>
-            <a:ext cx="1045672" cy="10277475"/>
+            <a:off x="4916" y="0"/>
+            <a:ext cx="6858000" cy="10287000"/>
           </a:xfrm>
           <a:prstGeom prst="rect">
             <a:avLst/>
           </a:prstGeom>
         </p:spPr>
-        <p:txBody>
-          <a:bodyPr lIns="0" tIns="0" rIns="0" bIns="0" rtlCol="0" anchor="t">
-            <a:spAutoFit/>
-          </a:bodyPr>
-          <a:lstStyle/>
-          <a:p>
-            <a:pPr algn="ctr">
-              <a:lnSpc>
-                <a:spcPts val="10158"/>
-              </a:lnSpc>
-            </a:pPr>
-            <a:r>
-              <a:rPr lang="en-US" sz="8465" b="1">
-                <a:solidFill>
-                  <a:srgbClr val="305049"/>
-                </a:solidFill>
-                <a:latin typeface="Muli Heavy"/>
-                <a:ea typeface="Muli Heavy"/>
-                <a:cs typeface="Muli Heavy"/>
-                <a:sym typeface="Muli Heavy"/>
-              </a:rPr>
-              <a:t>S</a:t>
-            </a:r>
-          </a:p>
-          <a:p>
-            <a:pPr algn="ctr">
-              <a:lnSpc>
-                <a:spcPts val="10158"/>
-              </a:lnSpc>
-            </a:pPr>
-            <a:r>
-              <a:rPr lang="en-US" sz="8465" b="1">
-                <a:solidFill>
-                  <a:srgbClr val="305049"/>
-                </a:solidFill>
-                <a:latin typeface="Muli Heavy"/>
-                <a:ea typeface="Muli Heavy"/>
-                <a:cs typeface="Muli Heavy"/>
-                <a:sym typeface="Muli Heavy"/>
-              </a:rPr>
-              <a:t>E</a:t>
-            </a:r>
-          </a:p>
-          <a:p>
-            <a:pPr algn="ctr">
-              <a:lnSpc>
-                <a:spcPts val="10158"/>
-              </a:lnSpc>
-            </a:pPr>
-            <a:r>
-              <a:rPr lang="en-US" sz="8465" b="1">
-                <a:solidFill>
-                  <a:srgbClr val="305049"/>
-                </a:solidFill>
-                <a:latin typeface="Muli Heavy"/>
-                <a:ea typeface="Muli Heavy"/>
-                <a:cs typeface="Muli Heavy"/>
-                <a:sym typeface="Muli Heavy"/>
-              </a:rPr>
-              <a:t>R</a:t>
-            </a:r>
-          </a:p>
-          <a:p>
-            <a:pPr algn="ctr">
-              <a:lnSpc>
-                <a:spcPts val="10158"/>
-              </a:lnSpc>
-            </a:pPr>
-            <a:r>
-              <a:rPr lang="en-US" sz="8465" b="1">
-                <a:solidFill>
-                  <a:srgbClr val="305049"/>
-                </a:solidFill>
-                <a:latin typeface="Muli Heavy"/>
-                <a:ea typeface="Muli Heavy"/>
-                <a:cs typeface="Muli Heavy"/>
-                <a:sym typeface="Muli Heavy"/>
-              </a:rPr>
-              <a:t>V</a:t>
-            </a:r>
-          </a:p>
-          <a:p>
-            <a:pPr algn="ctr">
-              <a:lnSpc>
-                <a:spcPts val="10158"/>
-              </a:lnSpc>
-            </a:pPr>
-            <a:r>
-              <a:rPr lang="en-US" sz="8465" b="1">
-                <a:solidFill>
-                  <a:srgbClr val="305049"/>
-                </a:solidFill>
-                <a:latin typeface="Muli Heavy"/>
-                <a:ea typeface="Muli Heavy"/>
-                <a:cs typeface="Muli Heavy"/>
-                <a:sym typeface="Muli Heavy"/>
-              </a:rPr>
-              <a:t>I</a:t>
-            </a:r>
-          </a:p>
-          <a:p>
-            <a:pPr algn="ctr">
-              <a:lnSpc>
-                <a:spcPts val="10158"/>
-              </a:lnSpc>
-            </a:pPr>
-            <a:r>
-              <a:rPr lang="en-US" sz="8465" b="1">
-                <a:solidFill>
-                  <a:srgbClr val="305049"/>
-                </a:solidFill>
-                <a:latin typeface="Muli Heavy"/>
-                <a:ea typeface="Muli Heavy"/>
-                <a:cs typeface="Muli Heavy"/>
-                <a:sym typeface="Muli Heavy"/>
-              </a:rPr>
-              <a:t>C</a:t>
-            </a:r>
-          </a:p>
-          <a:p>
-            <a:pPr algn="ctr">
-              <a:lnSpc>
-                <a:spcPts val="10158"/>
-              </a:lnSpc>
-            </a:pPr>
-            <a:r>
-              <a:rPr lang="en-US" sz="8465" b="1">
-                <a:solidFill>
-                  <a:srgbClr val="305049"/>
-                </a:solidFill>
-                <a:latin typeface="Muli Heavy"/>
-                <a:ea typeface="Muli Heavy"/>
-                <a:cs typeface="Muli Heavy"/>
-                <a:sym typeface="Muli Heavy"/>
-              </a:rPr>
-              <a:t>E</a:t>
-            </a:r>
-          </a:p>
-          <a:p>
-            <a:pPr algn="ctr">
-              <a:lnSpc>
-                <a:spcPts val="10158"/>
-              </a:lnSpc>
-            </a:pPr>
-            <a:r>
-              <a:rPr lang="en-US" sz="8465" b="1">
-                <a:solidFill>
-                  <a:srgbClr val="305049"/>
-                </a:solidFill>
-                <a:latin typeface="Muli Heavy"/>
-                <a:ea typeface="Muli Heavy"/>
-                <a:cs typeface="Muli Heavy"/>
-                <a:sym typeface="Muli Heavy"/>
-              </a:rPr>
-              <a:t>S</a:t>
-            </a:r>
-          </a:p>
-        </p:txBody>
-      </p:sp>
+      </p:pic>
+      <p:pic>
+        <p:nvPicPr>
+          <p:cNvPr id="4" name="Picture 3">
+            <a:extLst>
+              <a:ext uri="{FF2B5EF4-FFF2-40B4-BE49-F238E27FC236}">
+                <a16:creationId xmlns:a16="http://schemas.microsoft.com/office/drawing/2014/main" id="{1D8503C8-8B10-A506-B29B-7343A7B89F39}"/>
+              </a:ext>
+            </a:extLst>
+          </p:cNvPr>
+          <p:cNvPicPr>
+            <a:picLocks noChangeAspect="1"/>
+          </p:cNvPicPr>
+          <p:nvPr/>
+        </p:nvPicPr>
+        <p:blipFill>
+          <a:blip r:embed="rId3">
+            <a:extLst>
+              <a:ext uri="{28A0092B-C50C-407E-A947-70E740481C1C}">
+                <a14:useLocalDpi xmlns:a14="http://schemas.microsoft.com/office/drawing/2010/main" val="0"/>
+              </a:ext>
+            </a:extLst>
+          </a:blip>
+          <a:stretch>
+            <a:fillRect/>
+          </a:stretch>
+        </p:blipFill>
+        <p:spPr>
+          <a:xfrm>
+            <a:off x="6705600" y="25810"/>
+            <a:ext cx="10896600" cy="10187112"/>
+          </a:xfrm>
+          <a:prstGeom prst="rect">
+            <a:avLst/>
+          </a:prstGeom>
+        </p:spPr>
+      </p:pic>
     </p:spTree>
+    <p:extLst>
+      <p:ext uri="{BB962C8B-B14F-4D97-AF65-F5344CB8AC3E}">
+        <p14:creationId xmlns:p14="http://schemas.microsoft.com/office/powerpoint/2010/main" val="126663855"/>
+      </p:ext>
+    </p:extLst>
   </p:cSld>
   <p:clrMapOvr>
     <a:masterClrMapping/>
@@ -6468,14 +8084,6 @@
 <file path=ppt/slides/slide8.xml><?xml version="1.0" encoding="utf-8"?>
 <p:sld xmlns:a="http://schemas.openxmlformats.org/drawingml/2006/main" xmlns:r="http://schemas.openxmlformats.org/officeDocument/2006/relationships" xmlns:p="http://schemas.openxmlformats.org/presentationml/2006/main">
   <p:cSld>
-    <p:bg>
-      <p:bgPr>
-        <a:solidFill>
-          <a:srgbClr val="EFD1A9"/>
-        </a:solidFill>
-        <a:effectLst/>
-      </p:bgPr>
-    </p:bg>
     <p:spTree>
       <p:nvGrpSpPr>
         <p:cNvPr id="1" name=""/>
@@ -6490,822 +8098,42 @@
           <a:chExt cx="0" cy="0"/>
         </a:xfrm>
       </p:grpSpPr>
-      <p:sp>
-        <p:nvSpPr>
-          <p:cNvPr id="2" name="TextBox 2"/>
-          <p:cNvSpPr txBox="1"/>
+      <p:pic>
+        <p:nvPicPr>
+          <p:cNvPr id="3" name="Picture 2">
+            <a:extLst>
+              <a:ext uri="{FF2B5EF4-FFF2-40B4-BE49-F238E27FC236}">
+                <a16:creationId xmlns:a16="http://schemas.microsoft.com/office/drawing/2014/main" id="{0DA02278-BFF7-C33B-EE51-159348D3C4C2}"/>
+              </a:ext>
+            </a:extLst>
+          </p:cNvPr>
+          <p:cNvPicPr>
+            <a:picLocks noChangeAspect="1"/>
+          </p:cNvPicPr>
           <p:nvPr/>
-        </p:nvSpPr>
+        </p:nvPicPr>
+        <p:blipFill>
+          <a:blip r:embed="rId2"/>
+          <a:stretch>
+            <a:fillRect/>
+          </a:stretch>
+        </p:blipFill>
         <p:spPr>
           <a:xfrm>
-            <a:off x="6750467" y="885825"/>
-            <a:ext cx="10508833" cy="1088863"/>
+            <a:off x="0" y="266700"/>
+            <a:ext cx="18239360" cy="9563100"/>
           </a:xfrm>
           <a:prstGeom prst="rect">
             <a:avLst/>
           </a:prstGeom>
         </p:spPr>
-        <p:txBody>
-          <a:bodyPr lIns="0" tIns="0" rIns="0" bIns="0" rtlCol="0" anchor="t">
-            <a:spAutoFit/>
-          </a:bodyPr>
-          <a:lstStyle/>
-          <a:p>
-            <a:pPr algn="l">
-              <a:lnSpc>
-                <a:spcPts val="8991"/>
-              </a:lnSpc>
-              <a:spcBef>
-                <a:spcPct val="0"/>
-              </a:spcBef>
-            </a:pPr>
-            <a:r>
-              <a:rPr lang="en-US" sz="6422" b="1" u="sng">
-                <a:solidFill>
-                  <a:srgbClr val="305049"/>
-                </a:solidFill>
-                <a:latin typeface="Muli Bold"/>
-                <a:ea typeface="Muli Bold"/>
-                <a:cs typeface="Muli Bold"/>
-                <a:sym typeface="Muli Bold"/>
-              </a:rPr>
-              <a:t>Technology Stack</a:t>
-            </a:r>
-          </a:p>
-        </p:txBody>
-      </p:sp>
-      <p:sp>
-        <p:nvSpPr>
-          <p:cNvPr id="3" name="TextBox 3"/>
-          <p:cNvSpPr txBox="1"/>
-          <p:nvPr/>
-        </p:nvSpPr>
-        <p:spPr>
-          <a:xfrm>
-            <a:off x="5705439" y="2218347"/>
-            <a:ext cx="5637525" cy="4324774"/>
-          </a:xfrm>
-          <a:prstGeom prst="rect">
-            <a:avLst/>
-          </a:prstGeom>
-        </p:spPr>
-        <p:txBody>
-          <a:bodyPr lIns="0" tIns="0" rIns="0" bIns="0" rtlCol="0" anchor="t">
-            <a:spAutoFit/>
-          </a:bodyPr>
-          <a:lstStyle/>
-          <a:p>
-            <a:pPr algn="l">
-              <a:lnSpc>
-                <a:spcPts val="3362"/>
-              </a:lnSpc>
-            </a:pPr>
-            <a:r>
-              <a:rPr lang="en-US" sz="2402" b="1" dirty="0">
-                <a:solidFill>
-                  <a:srgbClr val="305049"/>
-                </a:solidFill>
-                <a:latin typeface="Muli"/>
-                <a:ea typeface="Muli"/>
-                <a:cs typeface="Muli"/>
-                <a:sym typeface="Muli"/>
-              </a:rPr>
-              <a:t>Backend</a:t>
-            </a:r>
-          </a:p>
-          <a:p>
-            <a:pPr marL="518610" lvl="1" indent="-259305" algn="l">
-              <a:lnSpc>
-                <a:spcPts val="3362"/>
-              </a:lnSpc>
-              <a:buFont typeface="Arial"/>
-              <a:buChar char="•"/>
-            </a:pPr>
-            <a:r>
-              <a:rPr lang="en-US" sz="2402" dirty="0">
-                <a:solidFill>
-                  <a:srgbClr val="305049"/>
-                </a:solidFill>
-                <a:latin typeface="Muli"/>
-                <a:ea typeface="Muli"/>
-                <a:cs typeface="Muli"/>
-                <a:sym typeface="Muli"/>
-              </a:rPr>
-              <a:t>Java, Spring Boot</a:t>
-            </a:r>
-          </a:p>
-          <a:p>
-            <a:pPr marL="518610" lvl="1" indent="-259305" algn="l">
-              <a:lnSpc>
-                <a:spcPts val="3362"/>
-              </a:lnSpc>
-              <a:spcBef>
-                <a:spcPct val="0"/>
-              </a:spcBef>
-              <a:buFont typeface="Arial"/>
-              <a:buChar char="•"/>
-            </a:pPr>
-            <a:r>
-              <a:rPr lang="en-US" sz="2402" dirty="0">
-                <a:solidFill>
-                  <a:srgbClr val="305049"/>
-                </a:solidFill>
-                <a:latin typeface="Muli"/>
-                <a:ea typeface="Muli"/>
-                <a:cs typeface="Muli"/>
-                <a:sym typeface="Muli"/>
-              </a:rPr>
-              <a:t>Spring Security (JWT Authentication)</a:t>
-            </a:r>
-          </a:p>
-          <a:p>
-            <a:pPr marL="518610" lvl="1" indent="-259305" algn="l">
-              <a:lnSpc>
-                <a:spcPts val="3362"/>
-              </a:lnSpc>
-              <a:spcBef>
-                <a:spcPct val="0"/>
-              </a:spcBef>
-              <a:buFont typeface="Arial"/>
-              <a:buChar char="•"/>
-            </a:pPr>
-            <a:r>
-              <a:rPr lang="en-US" sz="2402" dirty="0">
-                <a:solidFill>
-                  <a:srgbClr val="305049"/>
-                </a:solidFill>
-                <a:latin typeface="Muli"/>
-                <a:ea typeface="Muli"/>
-                <a:cs typeface="Muli"/>
-                <a:sym typeface="Muli"/>
-              </a:rPr>
-              <a:t>REST APIs</a:t>
-            </a:r>
-          </a:p>
-          <a:p>
-            <a:pPr algn="l">
-              <a:lnSpc>
-                <a:spcPts val="3362"/>
-              </a:lnSpc>
-              <a:spcBef>
-                <a:spcPct val="0"/>
-              </a:spcBef>
-            </a:pPr>
-            <a:endParaRPr lang="en-US" sz="2402" dirty="0">
-              <a:solidFill>
-                <a:srgbClr val="305049"/>
-              </a:solidFill>
-              <a:latin typeface="Muli"/>
-              <a:ea typeface="Muli"/>
-              <a:cs typeface="Muli"/>
-              <a:sym typeface="Muli"/>
-            </a:endParaRPr>
-          </a:p>
-          <a:p>
-            <a:pPr algn="l">
-              <a:lnSpc>
-                <a:spcPts val="3362"/>
-              </a:lnSpc>
-              <a:spcBef>
-                <a:spcPct val="0"/>
-              </a:spcBef>
-            </a:pPr>
-            <a:r>
-              <a:rPr lang="en-US" sz="2402" b="1" dirty="0">
-                <a:solidFill>
-                  <a:srgbClr val="305049"/>
-                </a:solidFill>
-                <a:latin typeface="Muli"/>
-                <a:ea typeface="Muli"/>
-                <a:cs typeface="Muli"/>
-                <a:sym typeface="Muli"/>
-              </a:rPr>
-              <a:t>Frontend</a:t>
-            </a:r>
-          </a:p>
-          <a:p>
-            <a:pPr marL="518610" lvl="1" indent="-259305" algn="l">
-              <a:lnSpc>
-                <a:spcPts val="3362"/>
-              </a:lnSpc>
-              <a:spcBef>
-                <a:spcPct val="0"/>
-              </a:spcBef>
-              <a:buFont typeface="Arial"/>
-              <a:buChar char="•"/>
-            </a:pPr>
-            <a:r>
-              <a:rPr lang="en-US" sz="2402" dirty="0">
-                <a:solidFill>
-                  <a:srgbClr val="305049"/>
-                </a:solidFill>
-                <a:latin typeface="Muli"/>
-                <a:ea typeface="Muli"/>
-                <a:cs typeface="Muli"/>
-                <a:sym typeface="Muli"/>
-              </a:rPr>
-              <a:t>Angular</a:t>
-            </a:r>
-          </a:p>
-          <a:p>
-            <a:pPr marL="518610" lvl="1" indent="-259305" algn="l">
-              <a:lnSpc>
-                <a:spcPts val="3362"/>
-              </a:lnSpc>
-              <a:spcBef>
-                <a:spcPct val="0"/>
-              </a:spcBef>
-              <a:buFont typeface="Arial"/>
-              <a:buChar char="•"/>
-            </a:pPr>
-            <a:r>
-              <a:rPr lang="en-US" sz="2402" dirty="0">
-                <a:solidFill>
-                  <a:srgbClr val="305049"/>
-                </a:solidFill>
-                <a:latin typeface="Muli"/>
-                <a:ea typeface="Muli"/>
-                <a:cs typeface="Muli"/>
-                <a:sym typeface="Muli"/>
-              </a:rPr>
-              <a:t>Tailwind / CSS for UI design</a:t>
-            </a:r>
-          </a:p>
-          <a:p>
-            <a:pPr algn="l">
-              <a:lnSpc>
-                <a:spcPts val="3362"/>
-              </a:lnSpc>
-              <a:spcBef>
-                <a:spcPct val="0"/>
-              </a:spcBef>
-            </a:pPr>
-            <a:endParaRPr lang="en-US" sz="2402" dirty="0">
-              <a:solidFill>
-                <a:srgbClr val="305049"/>
-              </a:solidFill>
-              <a:latin typeface="Muli"/>
-              <a:ea typeface="Muli"/>
-              <a:cs typeface="Muli"/>
-              <a:sym typeface="Muli"/>
-            </a:endParaRPr>
-          </a:p>
-        </p:txBody>
-      </p:sp>
-      <p:sp>
-        <p:nvSpPr>
-          <p:cNvPr id="4" name="Freeform 4"/>
-          <p:cNvSpPr/>
-          <p:nvPr/>
-        </p:nvSpPr>
-        <p:spPr>
-          <a:xfrm rot="-5400000">
-            <a:off x="-3066153" y="2436744"/>
-            <a:ext cx="10827025" cy="5413512"/>
-          </a:xfrm>
-          <a:custGeom>
-            <a:avLst/>
-            <a:gdLst/>
-            <a:ahLst/>
-            <a:cxnLst/>
-            <a:rect l="l" t="t" r="r" b="b"/>
-            <a:pathLst>
-              <a:path w="10827025" h="5413512">
-                <a:moveTo>
-                  <a:pt x="0" y="0"/>
-                </a:moveTo>
-                <a:lnTo>
-                  <a:pt x="10827024" y="0"/>
-                </a:lnTo>
-                <a:lnTo>
-                  <a:pt x="10827024" y="5413512"/>
-                </a:lnTo>
-                <a:lnTo>
-                  <a:pt x="0" y="5413512"/>
-                </a:lnTo>
-                <a:lnTo>
-                  <a:pt x="0" y="0"/>
-                </a:lnTo>
-                <a:close/>
-              </a:path>
-            </a:pathLst>
-          </a:custGeom>
-          <a:blipFill>
-            <a:blip r:embed="rId2">
-              <a:extLst>
-                <a:ext uri="{96DAC541-7B7A-43D3-8B79-37D633B846F1}">
-                  <asvg:svgBlip xmlns:asvg="http://schemas.microsoft.com/office/drawing/2016/SVG/main" r:embed="rId3"/>
-                </a:ext>
-              </a:extLst>
-            </a:blip>
-            <a:stretch>
-              <a:fillRect/>
-            </a:stretch>
-          </a:blipFill>
-        </p:spPr>
-      </p:sp>
-      <p:sp>
-        <p:nvSpPr>
-          <p:cNvPr id="5" name="TextBox 5"/>
-          <p:cNvSpPr txBox="1"/>
-          <p:nvPr/>
-        </p:nvSpPr>
-        <p:spPr>
-          <a:xfrm>
-            <a:off x="11621775" y="2218347"/>
-            <a:ext cx="5637525" cy="4760790"/>
-          </a:xfrm>
-          <a:prstGeom prst="rect">
-            <a:avLst/>
-          </a:prstGeom>
-        </p:spPr>
-        <p:txBody>
-          <a:bodyPr lIns="0" tIns="0" rIns="0" bIns="0" rtlCol="0" anchor="t">
-            <a:spAutoFit/>
-          </a:bodyPr>
-          <a:lstStyle/>
-          <a:p>
-            <a:pPr algn="l">
-              <a:lnSpc>
-                <a:spcPts val="3362"/>
-              </a:lnSpc>
-              <a:spcBef>
-                <a:spcPct val="0"/>
-              </a:spcBef>
-            </a:pPr>
-            <a:r>
-              <a:rPr lang="en-US" sz="2402" b="1" dirty="0">
-                <a:solidFill>
-                  <a:srgbClr val="305049"/>
-                </a:solidFill>
-                <a:latin typeface="Muli"/>
-                <a:ea typeface="Muli"/>
-                <a:cs typeface="Muli"/>
-                <a:sym typeface="Muli"/>
-              </a:rPr>
-              <a:t>Database</a:t>
-            </a:r>
-          </a:p>
-          <a:p>
-            <a:pPr marL="518610" lvl="1" indent="-259305" algn="l">
-              <a:lnSpc>
-                <a:spcPts val="3362"/>
-              </a:lnSpc>
-              <a:spcBef>
-                <a:spcPct val="0"/>
-              </a:spcBef>
-              <a:buFont typeface="Arial"/>
-              <a:buChar char="•"/>
-            </a:pPr>
-            <a:r>
-              <a:rPr lang="en-US" sz="2402" dirty="0">
-                <a:solidFill>
-                  <a:srgbClr val="305049"/>
-                </a:solidFill>
-                <a:latin typeface="Muli"/>
-                <a:ea typeface="Muli"/>
-                <a:cs typeface="Muli"/>
-                <a:sym typeface="Muli"/>
-              </a:rPr>
-              <a:t>MongoDB (NoSQL)</a:t>
-            </a:r>
-          </a:p>
-          <a:p>
-            <a:pPr algn="l">
-              <a:lnSpc>
-                <a:spcPts val="3362"/>
-              </a:lnSpc>
-              <a:spcBef>
-                <a:spcPct val="0"/>
-              </a:spcBef>
-            </a:pPr>
-            <a:endParaRPr lang="en-US" sz="2402" dirty="0">
-              <a:solidFill>
-                <a:srgbClr val="305049"/>
-              </a:solidFill>
-              <a:latin typeface="Muli"/>
-              <a:ea typeface="Muli"/>
-              <a:cs typeface="Muli"/>
-              <a:sym typeface="Muli"/>
-            </a:endParaRPr>
-          </a:p>
-          <a:p>
-            <a:pPr algn="l">
-              <a:lnSpc>
-                <a:spcPts val="3362"/>
-              </a:lnSpc>
-              <a:spcBef>
-                <a:spcPct val="0"/>
-              </a:spcBef>
-            </a:pPr>
-            <a:r>
-              <a:rPr lang="en-US" sz="2402" b="1" dirty="0">
-                <a:solidFill>
-                  <a:srgbClr val="305049"/>
-                </a:solidFill>
-                <a:latin typeface="Muli"/>
-                <a:ea typeface="Muli"/>
-                <a:cs typeface="Muli"/>
-                <a:sym typeface="Muli"/>
-              </a:rPr>
-              <a:t>Messaging</a:t>
-            </a:r>
-          </a:p>
-          <a:p>
-            <a:pPr marL="518610" lvl="1" indent="-259305" algn="l">
-              <a:lnSpc>
-                <a:spcPts val="3362"/>
-              </a:lnSpc>
-              <a:spcBef>
-                <a:spcPct val="0"/>
-              </a:spcBef>
-              <a:buFont typeface="Arial"/>
-              <a:buChar char="•"/>
-            </a:pPr>
-            <a:r>
-              <a:rPr lang="en-US" sz="2402" dirty="0">
-                <a:solidFill>
-                  <a:srgbClr val="305049"/>
-                </a:solidFill>
-                <a:latin typeface="Muli"/>
-                <a:ea typeface="Muli"/>
-                <a:cs typeface="Muli"/>
-                <a:sym typeface="Muli"/>
-              </a:rPr>
-              <a:t>RabbitMQ</a:t>
-            </a:r>
-          </a:p>
-          <a:p>
-            <a:pPr algn="l">
-              <a:lnSpc>
-                <a:spcPts val="3362"/>
-              </a:lnSpc>
-              <a:spcBef>
-                <a:spcPct val="0"/>
-              </a:spcBef>
-            </a:pPr>
-            <a:endParaRPr lang="en-US" sz="2402" dirty="0">
-              <a:solidFill>
-                <a:srgbClr val="305049"/>
-              </a:solidFill>
-              <a:latin typeface="Muli"/>
-              <a:ea typeface="Muli"/>
-              <a:cs typeface="Muli"/>
-              <a:sym typeface="Muli"/>
-            </a:endParaRPr>
-          </a:p>
-          <a:p>
-            <a:pPr algn="l">
-              <a:lnSpc>
-                <a:spcPts val="3362"/>
-              </a:lnSpc>
-              <a:spcBef>
-                <a:spcPct val="0"/>
-              </a:spcBef>
-            </a:pPr>
-            <a:r>
-              <a:rPr lang="en-US" sz="2402" b="1" dirty="0">
-                <a:solidFill>
-                  <a:srgbClr val="305049"/>
-                </a:solidFill>
-                <a:latin typeface="Muli"/>
-                <a:ea typeface="Muli"/>
-                <a:cs typeface="Muli"/>
-                <a:sym typeface="Muli"/>
-              </a:rPr>
-              <a:t>DevOps &amp; Quality</a:t>
-            </a:r>
-          </a:p>
-          <a:p>
-            <a:pPr marL="518610" lvl="1" indent="-259305" algn="l">
-              <a:lnSpc>
-                <a:spcPts val="3362"/>
-              </a:lnSpc>
-              <a:spcBef>
-                <a:spcPct val="0"/>
-              </a:spcBef>
-              <a:buFont typeface="Arial"/>
-              <a:buChar char="•"/>
-            </a:pPr>
-            <a:r>
-              <a:rPr lang="en-US" sz="2402" dirty="0">
-                <a:solidFill>
-                  <a:srgbClr val="305049"/>
-                </a:solidFill>
-                <a:latin typeface="Muli"/>
-                <a:ea typeface="Muli"/>
-                <a:cs typeface="Muli"/>
-                <a:sym typeface="Muli"/>
-              </a:rPr>
-              <a:t>Docker, Docker Compose</a:t>
-            </a:r>
-          </a:p>
-          <a:p>
-            <a:pPr marL="518610" lvl="1" indent="-259305" algn="l">
-              <a:lnSpc>
-                <a:spcPts val="3362"/>
-              </a:lnSpc>
-              <a:spcBef>
-                <a:spcPct val="0"/>
-              </a:spcBef>
-              <a:buFont typeface="Arial"/>
-              <a:buChar char="•"/>
-            </a:pPr>
-            <a:r>
-              <a:rPr lang="en-US" sz="2402" dirty="0">
-                <a:solidFill>
-                  <a:srgbClr val="305049"/>
-                </a:solidFill>
-                <a:latin typeface="Muli"/>
-                <a:ea typeface="Muli"/>
-                <a:cs typeface="Muli"/>
-                <a:sym typeface="Muli"/>
-              </a:rPr>
-              <a:t>SonarQube for code quality</a:t>
-            </a:r>
-          </a:p>
-          <a:p>
-            <a:pPr marL="518610" lvl="1" indent="-259305" algn="l">
-              <a:lnSpc>
-                <a:spcPts val="3362"/>
-              </a:lnSpc>
-              <a:spcBef>
-                <a:spcPct val="0"/>
-              </a:spcBef>
-              <a:buFont typeface="Arial"/>
-              <a:buChar char="•"/>
-            </a:pPr>
-            <a:r>
-              <a:rPr lang="en-US" sz="2402" dirty="0">
-                <a:solidFill>
-                  <a:srgbClr val="305049"/>
-                </a:solidFill>
-                <a:latin typeface="Muli"/>
-                <a:ea typeface="Muli"/>
-                <a:cs typeface="Muli"/>
-                <a:sym typeface="Muli"/>
-              </a:rPr>
-              <a:t>Jenkins Pipeline</a:t>
-            </a:r>
-          </a:p>
-          <a:p>
-            <a:pPr algn="l">
-              <a:lnSpc>
-                <a:spcPts val="3362"/>
-              </a:lnSpc>
-              <a:spcBef>
-                <a:spcPct val="0"/>
-              </a:spcBef>
-            </a:pPr>
-            <a:endParaRPr lang="en-US" sz="2402" dirty="0">
-              <a:solidFill>
-                <a:srgbClr val="305049"/>
-              </a:solidFill>
-              <a:latin typeface="Muli"/>
-              <a:ea typeface="Muli"/>
-              <a:cs typeface="Muli"/>
-              <a:sym typeface="Muli"/>
-            </a:endParaRPr>
-          </a:p>
-        </p:txBody>
-      </p:sp>
-      <p:sp>
-        <p:nvSpPr>
-          <p:cNvPr id="6" name="TextBox 6"/>
-          <p:cNvSpPr txBox="1"/>
-          <p:nvPr/>
-        </p:nvSpPr>
-        <p:spPr>
-          <a:xfrm>
-            <a:off x="5054115" y="7669769"/>
-            <a:ext cx="2547045" cy="438785"/>
-          </a:xfrm>
-          <a:prstGeom prst="rect">
-            <a:avLst/>
-          </a:prstGeom>
-        </p:spPr>
-        <p:txBody>
-          <a:bodyPr lIns="0" tIns="0" rIns="0" bIns="0" rtlCol="0" anchor="t">
-            <a:spAutoFit/>
-          </a:bodyPr>
-          <a:lstStyle/>
-          <a:p>
-            <a:pPr algn="ctr">
-              <a:lnSpc>
-                <a:spcPts val="3639"/>
-              </a:lnSpc>
-              <a:spcBef>
-                <a:spcPct val="0"/>
-              </a:spcBef>
-            </a:pPr>
-            <a:r>
-              <a:rPr lang="en-US" sz="2599" b="1">
-                <a:solidFill>
-                  <a:srgbClr val="305049"/>
-                </a:solidFill>
-                <a:latin typeface="Muli Bold"/>
-                <a:ea typeface="Muli Bold"/>
-                <a:cs typeface="Muli Bold"/>
-                <a:sym typeface="Muli Bold"/>
-              </a:rPr>
-              <a:t>Why MongoDB?</a:t>
-            </a:r>
-          </a:p>
-        </p:txBody>
-      </p:sp>
-      <p:sp>
-        <p:nvSpPr>
-          <p:cNvPr id="7" name="TextBox 7"/>
-          <p:cNvSpPr txBox="1"/>
-          <p:nvPr/>
-        </p:nvSpPr>
-        <p:spPr>
-          <a:xfrm>
-            <a:off x="8281690" y="7043659"/>
-            <a:ext cx="9175322" cy="2920365"/>
-          </a:xfrm>
-          <a:prstGeom prst="rect">
-            <a:avLst/>
-          </a:prstGeom>
-        </p:spPr>
-        <p:txBody>
-          <a:bodyPr lIns="0" tIns="0" rIns="0" bIns="0" rtlCol="0" anchor="t">
-            <a:spAutoFit/>
-          </a:bodyPr>
-          <a:lstStyle/>
-          <a:p>
-            <a:pPr algn="l">
-              <a:lnSpc>
-                <a:spcPts val="3359"/>
-              </a:lnSpc>
-              <a:spcBef>
-                <a:spcPct val="0"/>
-              </a:spcBef>
-            </a:pPr>
-            <a:r>
-              <a:rPr lang="en-US" sz="2400" b="1">
-                <a:solidFill>
-                  <a:srgbClr val="305049"/>
-                </a:solidFill>
-                <a:latin typeface="Muli Bold"/>
-                <a:ea typeface="Muli Bold"/>
-                <a:cs typeface="Muli Bold"/>
-                <a:sym typeface="Muli Bold"/>
-              </a:rPr>
-              <a:t>Schema-flexible:</a:t>
-            </a:r>
-            <a:r>
-              <a:rPr lang="en-US" sz="2400">
-                <a:solidFill>
-                  <a:srgbClr val="305049"/>
-                </a:solidFill>
-                <a:latin typeface="Muli"/>
-                <a:ea typeface="Muli"/>
-                <a:cs typeface="Muli"/>
-                <a:sym typeface="Muli"/>
-              </a:rPr>
-              <a:t> Easily handles evolving data models</a:t>
-            </a:r>
-          </a:p>
-          <a:p>
-            <a:pPr algn="l">
-              <a:lnSpc>
-                <a:spcPts val="3359"/>
-              </a:lnSpc>
-              <a:spcBef>
-                <a:spcPct val="0"/>
-              </a:spcBef>
-            </a:pPr>
-            <a:r>
-              <a:rPr lang="en-US" sz="2400" b="1">
-                <a:solidFill>
-                  <a:srgbClr val="305049"/>
-                </a:solidFill>
-                <a:latin typeface="Muli Bold"/>
-                <a:ea typeface="Muli Bold"/>
-                <a:cs typeface="Muli Bold"/>
-                <a:sym typeface="Muli Bold"/>
-              </a:rPr>
-              <a:t>Document-centric data model:</a:t>
-            </a:r>
-            <a:r>
-              <a:rPr lang="en-US" sz="2400">
-                <a:solidFill>
-                  <a:srgbClr val="305049"/>
-                </a:solidFill>
-                <a:latin typeface="Muli"/>
-                <a:ea typeface="Muli"/>
-                <a:cs typeface="Muli"/>
-                <a:sym typeface="Muli"/>
-              </a:rPr>
-              <a:t> Ideal for nested JSON-like data used in microservices</a:t>
-            </a:r>
-          </a:p>
-          <a:p>
-            <a:pPr algn="l">
-              <a:lnSpc>
-                <a:spcPts val="3359"/>
-              </a:lnSpc>
-              <a:spcBef>
-                <a:spcPct val="0"/>
-              </a:spcBef>
-            </a:pPr>
-            <a:r>
-              <a:rPr lang="en-US" sz="2400" b="1">
-                <a:solidFill>
-                  <a:srgbClr val="305049"/>
-                </a:solidFill>
-                <a:latin typeface="Muli Bold"/>
-                <a:ea typeface="Muli Bold"/>
-                <a:cs typeface="Muli Bold"/>
-                <a:sym typeface="Muli Bold"/>
-              </a:rPr>
-              <a:t>High performance:</a:t>
-            </a:r>
-            <a:r>
-              <a:rPr lang="en-US" sz="2400">
-                <a:solidFill>
-                  <a:srgbClr val="305049"/>
-                </a:solidFill>
-                <a:latin typeface="Muli"/>
-                <a:ea typeface="Muli"/>
-                <a:cs typeface="Muli"/>
-                <a:sym typeface="Muli"/>
-              </a:rPr>
-              <a:t> Fast read/write operations</a:t>
-            </a:r>
-          </a:p>
-          <a:p>
-            <a:pPr algn="l">
-              <a:lnSpc>
-                <a:spcPts val="3359"/>
-              </a:lnSpc>
-              <a:spcBef>
-                <a:spcPct val="0"/>
-              </a:spcBef>
-            </a:pPr>
-            <a:r>
-              <a:rPr lang="en-US" sz="2400" b="1">
-                <a:solidFill>
-                  <a:srgbClr val="305049"/>
-                </a:solidFill>
-                <a:latin typeface="Muli Bold"/>
-                <a:ea typeface="Muli Bold"/>
-                <a:cs typeface="Muli Bold"/>
-                <a:sym typeface="Muli Bold"/>
-              </a:rPr>
-              <a:t>Scalability:</a:t>
-            </a:r>
-            <a:r>
-              <a:rPr lang="en-US" sz="2400">
-                <a:solidFill>
-                  <a:srgbClr val="305049"/>
-                </a:solidFill>
-                <a:latin typeface="Muli"/>
-                <a:ea typeface="Muli"/>
-                <a:cs typeface="Muli"/>
-                <a:sym typeface="Muli"/>
-              </a:rPr>
-              <a:t> Supports horizontal scaling for growing data</a:t>
-            </a:r>
-          </a:p>
-          <a:p>
-            <a:pPr algn="l">
-              <a:lnSpc>
-                <a:spcPts val="3359"/>
-              </a:lnSpc>
-              <a:spcBef>
-                <a:spcPct val="0"/>
-              </a:spcBef>
-            </a:pPr>
-            <a:r>
-              <a:rPr lang="en-US" sz="2400" b="1">
-                <a:solidFill>
-                  <a:srgbClr val="305049"/>
-                </a:solidFill>
-                <a:latin typeface="Muli Bold"/>
-                <a:ea typeface="Muli Bold"/>
-                <a:cs typeface="Muli Bold"/>
-                <a:sym typeface="Muli Bold"/>
-              </a:rPr>
-              <a:t>Microservice-Friendly Data Isolation:</a:t>
-            </a:r>
-            <a:r>
-              <a:rPr lang="en-US" sz="2400">
-                <a:solidFill>
-                  <a:srgbClr val="305049"/>
-                </a:solidFill>
-                <a:latin typeface="Muli"/>
-                <a:ea typeface="Muli"/>
-                <a:cs typeface="Muli"/>
-                <a:sym typeface="Muli"/>
-              </a:rPr>
-              <a:t> Each microservice maintains its own database hence loose coupling</a:t>
-            </a:r>
-          </a:p>
-        </p:txBody>
-      </p:sp>
+      </p:pic>
     </p:spTree>
+    <p:extLst>
+      <p:ext uri="{BB962C8B-B14F-4D97-AF65-F5344CB8AC3E}">
+        <p14:creationId xmlns:p14="http://schemas.microsoft.com/office/powerpoint/2010/main" val="1043623206"/>
+      </p:ext>
+    </p:extLst>
   </p:cSld>
   <p:clrMapOvr>
     <a:masterClrMapping/>
@@ -7316,14 +8144,6 @@
 <file path=ppt/slides/slide9.xml><?xml version="1.0" encoding="utf-8"?>
 <p:sld xmlns:a="http://schemas.openxmlformats.org/drawingml/2006/main" xmlns:r="http://schemas.openxmlformats.org/officeDocument/2006/relationships" xmlns:p="http://schemas.openxmlformats.org/presentationml/2006/main">
   <p:cSld>
-    <p:bg>
-      <p:bgPr>
-        <a:solidFill>
-          <a:srgbClr val="305049"/>
-        </a:solidFill>
-        <a:effectLst/>
-      </p:bgPr>
-    </p:bg>
     <p:spTree>
       <p:nvGrpSpPr>
         <p:cNvPr id="1" name=""/>
@@ -7338,453 +8158,102 @@
           <a:chExt cx="0" cy="0"/>
         </a:xfrm>
       </p:grpSpPr>
-      <p:sp>
-        <p:nvSpPr>
-          <p:cNvPr id="2" name="Freeform 2"/>
-          <p:cNvSpPr/>
+      <p:pic>
+        <p:nvPicPr>
+          <p:cNvPr id="3" name="Picture 2">
+            <a:extLst>
+              <a:ext uri="{FF2B5EF4-FFF2-40B4-BE49-F238E27FC236}">
+                <a16:creationId xmlns:a16="http://schemas.microsoft.com/office/drawing/2014/main" id="{C2DDEF2E-07EE-22F8-423B-C0CC1AA89D0E}"/>
+              </a:ext>
+            </a:extLst>
+          </p:cNvPr>
+          <p:cNvPicPr>
+            <a:picLocks noChangeAspect="1"/>
+          </p:cNvPicPr>
           <p:nvPr/>
-        </p:nvSpPr>
-        <p:spPr>
-          <a:xfrm rot="-5400000">
-            <a:off x="646990" y="1029320"/>
-            <a:ext cx="1526842" cy="763421"/>
-          </a:xfrm>
-          <a:custGeom>
-            <a:avLst/>
-            <a:gdLst/>
-            <a:ahLst/>
-            <a:cxnLst/>
-            <a:rect l="l" t="t" r="r" b="b"/>
-            <a:pathLst>
-              <a:path w="1526842" h="763421">
-                <a:moveTo>
-                  <a:pt x="0" y="0"/>
-                </a:moveTo>
-                <a:lnTo>
-                  <a:pt x="1526841" y="0"/>
-                </a:lnTo>
-                <a:lnTo>
-                  <a:pt x="1526841" y="763420"/>
-                </a:lnTo>
-                <a:lnTo>
-                  <a:pt x="0" y="763420"/>
-                </a:lnTo>
-                <a:lnTo>
-                  <a:pt x="0" y="0"/>
-                </a:lnTo>
-                <a:close/>
-              </a:path>
-            </a:pathLst>
-          </a:custGeom>
-          <a:blipFill>
-            <a:blip r:embed="rId2">
-              <a:extLst>
-                <a:ext uri="{96DAC541-7B7A-43D3-8B79-37D633B846F1}">
-                  <asvg:svgBlip xmlns:asvg="http://schemas.microsoft.com/office/drawing/2016/SVG/main" r:embed="rId3"/>
-                </a:ext>
-              </a:extLst>
-            </a:blip>
-            <a:stretch>
-              <a:fillRect/>
-            </a:stretch>
-          </a:blipFill>
-        </p:spPr>
-      </p:sp>
-      <p:sp>
-        <p:nvSpPr>
-          <p:cNvPr id="3" name="TextBox 3"/>
-          <p:cNvSpPr txBox="1"/>
-          <p:nvPr/>
-        </p:nvSpPr>
+        </p:nvPicPr>
+        <p:blipFill>
+          <a:blip r:embed="rId2"/>
+          <a:stretch>
+            <a:fillRect/>
+          </a:stretch>
+        </p:blipFill>
         <p:spPr>
           <a:xfrm>
-            <a:off x="2292438" y="704759"/>
-            <a:ext cx="10024736" cy="909955"/>
+            <a:off x="2880564" y="38100"/>
+            <a:ext cx="7954485" cy="5191850"/>
           </a:xfrm>
           <a:prstGeom prst="rect">
             <a:avLst/>
           </a:prstGeom>
         </p:spPr>
-        <p:txBody>
-          <a:bodyPr lIns="0" tIns="0" rIns="0" bIns="0" rtlCol="0" anchor="t">
-            <a:spAutoFit/>
-          </a:bodyPr>
-          <a:lstStyle/>
-          <a:p>
-            <a:pPr algn="l">
-              <a:lnSpc>
-                <a:spcPts val="7039"/>
-              </a:lnSpc>
-            </a:pPr>
-            <a:r>
-              <a:rPr lang="en-US" sz="6399" b="1">
-                <a:solidFill>
-                  <a:srgbClr val="EFD1A9"/>
-                </a:solidFill>
-                <a:latin typeface="Muli Heavy"/>
-                <a:ea typeface="Muli Heavy"/>
-                <a:cs typeface="Muli Heavy"/>
-                <a:sym typeface="Muli Heavy"/>
-              </a:rPr>
-              <a:t>Key Features</a:t>
-            </a:r>
-          </a:p>
-        </p:txBody>
-      </p:sp>
-      <p:sp>
-        <p:nvSpPr>
-          <p:cNvPr id="4" name="TextBox 4"/>
-          <p:cNvSpPr txBox="1"/>
+      </p:pic>
+      <p:pic>
+        <p:nvPicPr>
+          <p:cNvPr id="5" name="Picture 4">
+            <a:extLst>
+              <a:ext uri="{FF2B5EF4-FFF2-40B4-BE49-F238E27FC236}">
+                <a16:creationId xmlns:a16="http://schemas.microsoft.com/office/drawing/2014/main" id="{07B61EE7-DA98-0363-3D52-691C7ADAE131}"/>
+              </a:ext>
+            </a:extLst>
+          </p:cNvPr>
+          <p:cNvPicPr>
+            <a:picLocks noChangeAspect="1"/>
+          </p:cNvPicPr>
           <p:nvPr/>
-        </p:nvSpPr>
+        </p:nvPicPr>
+        <p:blipFill>
+          <a:blip r:embed="rId3"/>
+          <a:stretch>
+            <a:fillRect/>
+          </a:stretch>
+        </p:blipFill>
         <p:spPr>
           <a:xfrm>
-            <a:off x="2163499" y="2117301"/>
-            <a:ext cx="10915328" cy="2418186"/>
+            <a:off x="0" y="5191850"/>
+            <a:ext cx="10839965" cy="5095150"/>
           </a:xfrm>
           <a:prstGeom prst="rect">
             <a:avLst/>
           </a:prstGeom>
         </p:spPr>
-        <p:txBody>
-          <a:bodyPr lIns="0" tIns="0" rIns="0" bIns="0" rtlCol="0" anchor="t">
-            <a:spAutoFit/>
-          </a:bodyPr>
-          <a:lstStyle/>
-          <a:p>
-            <a:pPr marL="597665" lvl="1" indent="-298832" algn="l">
-              <a:lnSpc>
-                <a:spcPts val="3875"/>
-              </a:lnSpc>
-              <a:spcBef>
-                <a:spcPct val="0"/>
-              </a:spcBef>
-              <a:buFont typeface="Arial"/>
-              <a:buChar char="•"/>
-            </a:pPr>
-            <a:r>
-              <a:rPr lang="en-US" sz="2768">
-                <a:solidFill>
-                  <a:srgbClr val="F1EEEE"/>
-                </a:solidFill>
-                <a:latin typeface="Muli"/>
-                <a:ea typeface="Muli"/>
-                <a:cs typeface="Muli"/>
-                <a:sym typeface="Muli"/>
-              </a:rPr>
-              <a:t>Role-based dashboards (Customer, Technician, Admin)</a:t>
-            </a:r>
-          </a:p>
-          <a:p>
-            <a:pPr marL="597665" lvl="1" indent="-298832" algn="l">
-              <a:lnSpc>
-                <a:spcPts val="3875"/>
-              </a:lnSpc>
-              <a:spcBef>
-                <a:spcPct val="0"/>
-              </a:spcBef>
-              <a:buFont typeface="Arial"/>
-              <a:buChar char="•"/>
-            </a:pPr>
-            <a:r>
-              <a:rPr lang="en-US" sz="2768">
-                <a:solidFill>
-                  <a:srgbClr val="F1EEEE"/>
-                </a:solidFill>
-                <a:latin typeface="Muli"/>
-                <a:ea typeface="Muli"/>
-                <a:cs typeface="Muli"/>
-                <a:sym typeface="Muli"/>
-              </a:rPr>
-              <a:t>Real-time email notifications</a:t>
-            </a:r>
-          </a:p>
-          <a:p>
-            <a:pPr marL="597665" lvl="1" indent="-298832" algn="l">
-              <a:lnSpc>
-                <a:spcPts val="3875"/>
-              </a:lnSpc>
-              <a:spcBef>
-                <a:spcPct val="0"/>
-              </a:spcBef>
-              <a:buFont typeface="Arial"/>
-              <a:buChar char="•"/>
-            </a:pPr>
-            <a:r>
-              <a:rPr lang="en-US" sz="2768">
-                <a:solidFill>
-                  <a:srgbClr val="F1EEEE"/>
-                </a:solidFill>
-                <a:latin typeface="Muli"/>
-                <a:ea typeface="Muli"/>
-                <a:cs typeface="Muli"/>
-                <a:sym typeface="Muli"/>
-              </a:rPr>
-              <a:t>Modular microservices architecture</a:t>
-            </a:r>
-          </a:p>
-          <a:p>
-            <a:pPr marL="597665" lvl="1" indent="-298832" algn="l">
-              <a:lnSpc>
-                <a:spcPts val="3875"/>
-              </a:lnSpc>
-              <a:spcBef>
-                <a:spcPct val="0"/>
-              </a:spcBef>
-              <a:buFont typeface="Arial"/>
-              <a:buChar char="•"/>
-            </a:pPr>
-            <a:r>
-              <a:rPr lang="en-US" sz="2768">
-                <a:solidFill>
-                  <a:srgbClr val="F1EEEE"/>
-                </a:solidFill>
-                <a:latin typeface="Muli"/>
-                <a:ea typeface="Muli"/>
-                <a:cs typeface="Muli"/>
-                <a:sym typeface="Muli"/>
-              </a:rPr>
-              <a:t>Clean UI with modern design</a:t>
-            </a:r>
-          </a:p>
-          <a:p>
-            <a:pPr marL="597665" lvl="1" indent="-298832" algn="l">
-              <a:lnSpc>
-                <a:spcPts val="3875"/>
-              </a:lnSpc>
-              <a:spcBef>
-                <a:spcPct val="0"/>
-              </a:spcBef>
-              <a:buFont typeface="Arial"/>
-              <a:buChar char="•"/>
-            </a:pPr>
-            <a:r>
-              <a:rPr lang="en-US" sz="2768">
-                <a:solidFill>
-                  <a:srgbClr val="F1EEEE"/>
-                </a:solidFill>
-                <a:latin typeface="Muli"/>
-                <a:ea typeface="Muli"/>
-                <a:cs typeface="Muli"/>
-                <a:sym typeface="Muli"/>
-              </a:rPr>
-              <a:t>Scalable and maintainable backend</a:t>
-            </a:r>
-          </a:p>
-        </p:txBody>
-      </p:sp>
-      <p:sp>
-        <p:nvSpPr>
-          <p:cNvPr id="5" name="Freeform 5"/>
-          <p:cNvSpPr/>
+      </p:pic>
+      <p:pic>
+        <p:nvPicPr>
+          <p:cNvPr id="7" name="Picture 6">
+            <a:extLst>
+              <a:ext uri="{FF2B5EF4-FFF2-40B4-BE49-F238E27FC236}">
+                <a16:creationId xmlns:a16="http://schemas.microsoft.com/office/drawing/2014/main" id="{06107CD4-39EB-D6B8-5583-6C69956C0219}"/>
+              </a:ext>
+            </a:extLst>
+          </p:cNvPr>
+          <p:cNvPicPr>
+            <a:picLocks noChangeAspect="1"/>
+          </p:cNvPicPr>
           <p:nvPr/>
-        </p:nvSpPr>
-        <p:spPr>
-          <a:xfrm rot="-10800000">
-            <a:off x="-2292062" y="6785816"/>
-            <a:ext cx="7064180" cy="3532090"/>
-          </a:xfrm>
-          <a:custGeom>
-            <a:avLst/>
-            <a:gdLst/>
-            <a:ahLst/>
-            <a:cxnLst/>
-            <a:rect l="l" t="t" r="r" b="b"/>
-            <a:pathLst>
-              <a:path w="7064180" h="3532090">
-                <a:moveTo>
-                  <a:pt x="0" y="0"/>
-                </a:moveTo>
-                <a:lnTo>
-                  <a:pt x="7064180" y="0"/>
-                </a:lnTo>
-                <a:lnTo>
-                  <a:pt x="7064180" y="3532090"/>
-                </a:lnTo>
-                <a:lnTo>
-                  <a:pt x="0" y="3532090"/>
-                </a:lnTo>
-                <a:lnTo>
-                  <a:pt x="0" y="0"/>
-                </a:lnTo>
-                <a:close/>
-              </a:path>
-            </a:pathLst>
-          </a:custGeom>
-          <a:blipFill>
-            <a:blip r:embed="rId4">
-              <a:extLst>
-                <a:ext uri="{96DAC541-7B7A-43D3-8B79-37D633B846F1}">
-                  <asvg:svgBlip xmlns:asvg="http://schemas.microsoft.com/office/drawing/2016/SVG/main" r:embed="rId5"/>
-                </a:ext>
-              </a:extLst>
-            </a:blip>
-            <a:stretch>
-              <a:fillRect/>
-            </a:stretch>
-          </a:blipFill>
-        </p:spPr>
-      </p:sp>
-      <p:sp>
-        <p:nvSpPr>
-          <p:cNvPr id="6" name="TextBox 6"/>
-          <p:cNvSpPr txBox="1"/>
-          <p:nvPr/>
-        </p:nvSpPr>
+        </p:nvPicPr>
+        <p:blipFill>
+          <a:blip r:embed="rId4"/>
+          <a:stretch>
+            <a:fillRect/>
+          </a:stretch>
+        </p:blipFill>
         <p:spPr>
           <a:xfrm>
-            <a:off x="7621163" y="5200650"/>
-            <a:ext cx="9638137" cy="909955"/>
+            <a:off x="10839965" y="0"/>
+            <a:ext cx="7445577" cy="10287000"/>
           </a:xfrm>
           <a:prstGeom prst="rect">
             <a:avLst/>
           </a:prstGeom>
         </p:spPr>
-        <p:txBody>
-          <a:bodyPr lIns="0" tIns="0" rIns="0" bIns="0" rtlCol="0" anchor="t">
-            <a:spAutoFit/>
-          </a:bodyPr>
-          <a:lstStyle/>
-          <a:p>
-            <a:pPr algn="l">
-              <a:lnSpc>
-                <a:spcPts val="7039"/>
-              </a:lnSpc>
-            </a:pPr>
-            <a:r>
-              <a:rPr lang="en-US" sz="6399" b="1" dirty="0">
-                <a:solidFill>
-                  <a:srgbClr val="EFD1A9"/>
-                </a:solidFill>
-                <a:latin typeface="Muli Heavy"/>
-                <a:ea typeface="Muli Heavy"/>
-                <a:cs typeface="Muli Heavy"/>
-                <a:sym typeface="Muli Heavy"/>
-              </a:rPr>
-              <a:t>Challenges &amp; Learnings </a:t>
-            </a:r>
-          </a:p>
-        </p:txBody>
-      </p:sp>
-      <p:sp>
-        <p:nvSpPr>
-          <p:cNvPr id="7" name="TextBox 7"/>
-          <p:cNvSpPr txBox="1"/>
-          <p:nvPr/>
-        </p:nvSpPr>
-        <p:spPr>
-          <a:xfrm>
-            <a:off x="9152138" y="6325173"/>
-            <a:ext cx="8107162" cy="1931916"/>
-          </a:xfrm>
-          <a:prstGeom prst="rect">
-            <a:avLst/>
-          </a:prstGeom>
-        </p:spPr>
-        <p:txBody>
-          <a:bodyPr lIns="0" tIns="0" rIns="0" bIns="0" rtlCol="0" anchor="t">
-            <a:spAutoFit/>
-          </a:bodyPr>
-          <a:lstStyle/>
-          <a:p>
-            <a:pPr marL="597665" lvl="1" indent="-298832" algn="l">
-              <a:lnSpc>
-                <a:spcPts val="3875"/>
-              </a:lnSpc>
-              <a:spcBef>
-                <a:spcPct val="0"/>
-              </a:spcBef>
-              <a:buFont typeface="Arial"/>
-              <a:buChar char="•"/>
-            </a:pPr>
-            <a:r>
-              <a:rPr lang="en-US" sz="2768" dirty="0">
-                <a:solidFill>
-                  <a:srgbClr val="F1EEEE"/>
-                </a:solidFill>
-                <a:latin typeface="Muli"/>
-                <a:ea typeface="Muli"/>
-                <a:cs typeface="Muli"/>
-                <a:sym typeface="Muli"/>
-              </a:rPr>
-              <a:t>Handling service-to-service communication</a:t>
-            </a:r>
-          </a:p>
-          <a:p>
-            <a:pPr marL="597665" lvl="1" indent="-298832" algn="l">
-              <a:lnSpc>
-                <a:spcPts val="3875"/>
-              </a:lnSpc>
-              <a:spcBef>
-                <a:spcPct val="0"/>
-              </a:spcBef>
-              <a:buFont typeface="Arial"/>
-              <a:buChar char="•"/>
-            </a:pPr>
-            <a:r>
-              <a:rPr lang="en-US" sz="2768" dirty="0">
-                <a:solidFill>
-                  <a:srgbClr val="F1EEEE"/>
-                </a:solidFill>
-                <a:latin typeface="Muli"/>
-                <a:ea typeface="Muli"/>
-                <a:cs typeface="Muli"/>
-                <a:sym typeface="Muli"/>
-              </a:rPr>
-              <a:t>Designing scalable microservices</a:t>
-            </a:r>
-          </a:p>
-          <a:p>
-            <a:pPr marL="597665" lvl="1" indent="-298832" algn="l">
-              <a:lnSpc>
-                <a:spcPts val="3875"/>
-              </a:lnSpc>
-              <a:spcBef>
-                <a:spcPct val="0"/>
-              </a:spcBef>
-              <a:buFont typeface="Arial"/>
-              <a:buChar char="•"/>
-            </a:pPr>
-            <a:r>
-              <a:rPr lang="en-US" sz="2768" dirty="0">
-                <a:solidFill>
-                  <a:srgbClr val="F1EEEE"/>
-                </a:solidFill>
-                <a:latin typeface="Muli"/>
-                <a:ea typeface="Muli"/>
-                <a:cs typeface="Muli"/>
-                <a:sym typeface="Muli"/>
-              </a:rPr>
-              <a:t>Integrating the frontend &amp; the backend</a:t>
-            </a:r>
-          </a:p>
-          <a:p>
-            <a:pPr marL="597665" lvl="1" indent="-298832" algn="l">
-              <a:lnSpc>
-                <a:spcPts val="3875"/>
-              </a:lnSpc>
-              <a:spcBef>
-                <a:spcPct val="0"/>
-              </a:spcBef>
-              <a:buFont typeface="Arial"/>
-              <a:buChar char="•"/>
-            </a:pPr>
-            <a:r>
-              <a:rPr lang="en-US" sz="2768" dirty="0">
-                <a:solidFill>
-                  <a:srgbClr val="F1EEEE"/>
-                </a:solidFill>
-                <a:latin typeface="Muli"/>
-                <a:ea typeface="Muli"/>
-                <a:cs typeface="Muli"/>
-                <a:sym typeface="Muli"/>
-              </a:rPr>
-              <a:t>Ensuring UI responsiveness and performance</a:t>
-            </a:r>
-          </a:p>
-        </p:txBody>
-      </p:sp>
+      </p:pic>
     </p:spTree>
+    <p:extLst>
+      <p:ext uri="{BB962C8B-B14F-4D97-AF65-F5344CB8AC3E}">
+        <p14:creationId xmlns:p14="http://schemas.microsoft.com/office/powerpoint/2010/main" val="1229431658"/>
+      </p:ext>
+    </p:extLst>
   </p:cSld>
   <p:clrMapOvr>
     <a:masterClrMapping/>

</xml_diff>